<commit_message>
Updated logistic and multinomial fits
</commit_message>
<xml_diff>
--- a/multinomial_logistic_fits/plots/bGLM_plot secondary_attack_rates_multipanel.pptx
+++ b/multinomial_logistic_fits/plots/bGLM_plot secondary_attack_rates_multipanel.pptx
@@ -7,14 +7,14 @@
   <p:sldIdLst xmlns:a="http://schemas.openxmlformats.org/drawingml/2006/main" xmlns:r="http://schemas.openxmlformats.org/officeDocument/2006/relationships" xmlns:p="http://schemas.openxmlformats.org/presentationml/2006/main">
     <p:sldId id="256" r:id="rId6"/>
   </p:sldIdLst>
-  <p:sldSz cx="15087600" cy="10698163"/>
+  <p:sldSz cx="10698163" cy="7562850"/>
   <p:notesSz cx="6858000" cy="9144000"/>
   <p:defaultTextStyle>
     <a:defPPr>
       <a:defRPr lang="en-US"/>
     </a:defPPr>
-    <a:lvl1pPr marL="0" algn="l" defTabSz="1052474" rtl="0" eaLnBrk="1" latinLnBrk="0" hangingPunct="1">
-      <a:defRPr sz="2100" kern="1200">
+    <a:lvl1pPr marL="0" algn="l" defTabSz="995964" rtl="0" eaLnBrk="1" latinLnBrk="0" hangingPunct="1">
+      <a:defRPr sz="2000" kern="1200">
         <a:solidFill>
           <a:schemeClr val="tx1"/>
         </a:solidFill>
@@ -23,8 +23,8 @@
         <a:cs typeface="+mn-cs"/>
       </a:defRPr>
     </a:lvl1pPr>
-    <a:lvl2pPr marL="526237" algn="l" defTabSz="1052474" rtl="0" eaLnBrk="1" latinLnBrk="0" hangingPunct="1">
-      <a:defRPr sz="2100" kern="1200">
+    <a:lvl2pPr marL="497982" algn="l" defTabSz="995964" rtl="0" eaLnBrk="1" latinLnBrk="0" hangingPunct="1">
+      <a:defRPr sz="2000" kern="1200">
         <a:solidFill>
           <a:schemeClr val="tx1"/>
         </a:solidFill>
@@ -33,8 +33,8 @@
         <a:cs typeface="+mn-cs"/>
       </a:defRPr>
     </a:lvl2pPr>
-    <a:lvl3pPr marL="1052474" algn="l" defTabSz="1052474" rtl="0" eaLnBrk="1" latinLnBrk="0" hangingPunct="1">
-      <a:defRPr sz="2100" kern="1200">
+    <a:lvl3pPr marL="995964" algn="l" defTabSz="995964" rtl="0" eaLnBrk="1" latinLnBrk="0" hangingPunct="1">
+      <a:defRPr sz="2000" kern="1200">
         <a:solidFill>
           <a:schemeClr val="tx1"/>
         </a:solidFill>
@@ -43,8 +43,8 @@
         <a:cs typeface="+mn-cs"/>
       </a:defRPr>
     </a:lvl3pPr>
-    <a:lvl4pPr marL="1578712" algn="l" defTabSz="1052474" rtl="0" eaLnBrk="1" latinLnBrk="0" hangingPunct="1">
-      <a:defRPr sz="2100" kern="1200">
+    <a:lvl4pPr marL="1493947" algn="l" defTabSz="995964" rtl="0" eaLnBrk="1" latinLnBrk="0" hangingPunct="1">
+      <a:defRPr sz="2000" kern="1200">
         <a:solidFill>
           <a:schemeClr val="tx1"/>
         </a:solidFill>
@@ -53,8 +53,8 @@
         <a:cs typeface="+mn-cs"/>
       </a:defRPr>
     </a:lvl4pPr>
-    <a:lvl5pPr marL="2104949" algn="l" defTabSz="1052474" rtl="0" eaLnBrk="1" latinLnBrk="0" hangingPunct="1">
-      <a:defRPr sz="2100" kern="1200">
+    <a:lvl5pPr marL="1991929" algn="l" defTabSz="995964" rtl="0" eaLnBrk="1" latinLnBrk="0" hangingPunct="1">
+      <a:defRPr sz="2000" kern="1200">
         <a:solidFill>
           <a:schemeClr val="tx1"/>
         </a:solidFill>
@@ -63,8 +63,8 @@
         <a:cs typeface="+mn-cs"/>
       </a:defRPr>
     </a:lvl5pPr>
-    <a:lvl6pPr marL="2631186" algn="l" defTabSz="1052474" rtl="0" eaLnBrk="1" latinLnBrk="0" hangingPunct="1">
-      <a:defRPr sz="2100" kern="1200">
+    <a:lvl6pPr marL="2489911" algn="l" defTabSz="995964" rtl="0" eaLnBrk="1" latinLnBrk="0" hangingPunct="1">
+      <a:defRPr sz="2000" kern="1200">
         <a:solidFill>
           <a:schemeClr val="tx1"/>
         </a:solidFill>
@@ -73,8 +73,8 @@
         <a:cs typeface="+mn-cs"/>
       </a:defRPr>
     </a:lvl6pPr>
-    <a:lvl7pPr marL="3157423" algn="l" defTabSz="1052474" rtl="0" eaLnBrk="1" latinLnBrk="0" hangingPunct="1">
-      <a:defRPr sz="2100" kern="1200">
+    <a:lvl7pPr marL="2987893" algn="l" defTabSz="995964" rtl="0" eaLnBrk="1" latinLnBrk="0" hangingPunct="1">
+      <a:defRPr sz="2000" kern="1200">
         <a:solidFill>
           <a:schemeClr val="tx1"/>
         </a:solidFill>
@@ -83,8 +83,8 @@
         <a:cs typeface="+mn-cs"/>
       </a:defRPr>
     </a:lvl7pPr>
-    <a:lvl8pPr marL="3683660" algn="l" defTabSz="1052474" rtl="0" eaLnBrk="1" latinLnBrk="0" hangingPunct="1">
-      <a:defRPr sz="2100" kern="1200">
+    <a:lvl8pPr marL="3485876" algn="l" defTabSz="995964" rtl="0" eaLnBrk="1" latinLnBrk="0" hangingPunct="1">
+      <a:defRPr sz="2000" kern="1200">
         <a:solidFill>
           <a:schemeClr val="tx1"/>
         </a:solidFill>
@@ -93,8 +93,8 @@
         <a:cs typeface="+mn-cs"/>
       </a:defRPr>
     </a:lvl8pPr>
-    <a:lvl9pPr marL="4209898" algn="l" defTabSz="1052474" rtl="0" eaLnBrk="1" latinLnBrk="0" hangingPunct="1">
-      <a:defRPr sz="2100" kern="1200">
+    <a:lvl9pPr marL="3983858" algn="l" defTabSz="995964" rtl="0" eaLnBrk="1" latinLnBrk="0" hangingPunct="1">
+      <a:defRPr sz="2000" kern="1200">
         <a:solidFill>
           <a:schemeClr val="tx1"/>
         </a:solidFill>
@@ -136,8 +136,8 @@
         </p:nvSpPr>
         <p:spPr>
           <a:xfrm>
-            <a:off x="1131570" y="3323370"/>
-            <a:ext cx="12824460" cy="2293171"/>
+            <a:off x="802362" y="2349388"/>
+            <a:ext cx="9093439" cy="1621111"/>
           </a:xfrm>
         </p:spPr>
         <p:txBody>
@@ -164,8 +164,8 @@
         </p:nvSpPr>
         <p:spPr>
           <a:xfrm>
-            <a:off x="2263140" y="6062292"/>
-            <a:ext cx="10561320" cy="2733975"/>
+            <a:off x="1604725" y="4285615"/>
+            <a:ext cx="7488714" cy="1932728"/>
           </a:xfrm>
         </p:spPr>
         <p:txBody>
@@ -181,7 +181,7 @@
                 </a:solidFill>
               </a:defRPr>
             </a:lvl1pPr>
-            <a:lvl2pPr marL="526237" indent="0" algn="ctr">
+            <a:lvl2pPr marL="497982" indent="0" algn="ctr">
               <a:buNone/>
               <a:defRPr>
                 <a:solidFill>
@@ -191,7 +191,7 @@
                 </a:solidFill>
               </a:defRPr>
             </a:lvl2pPr>
-            <a:lvl3pPr marL="1052474" indent="0" algn="ctr">
+            <a:lvl3pPr marL="995964" indent="0" algn="ctr">
               <a:buNone/>
               <a:defRPr>
                 <a:solidFill>
@@ -201,7 +201,7 @@
                 </a:solidFill>
               </a:defRPr>
             </a:lvl3pPr>
-            <a:lvl4pPr marL="1578712" indent="0" algn="ctr">
+            <a:lvl4pPr marL="1493947" indent="0" algn="ctr">
               <a:buNone/>
               <a:defRPr>
                 <a:solidFill>
@@ -211,7 +211,7 @@
                 </a:solidFill>
               </a:defRPr>
             </a:lvl4pPr>
-            <a:lvl5pPr marL="2104949" indent="0" algn="ctr">
+            <a:lvl5pPr marL="1991929" indent="0" algn="ctr">
               <a:buNone/>
               <a:defRPr>
                 <a:solidFill>
@@ -221,7 +221,7 @@
                 </a:solidFill>
               </a:defRPr>
             </a:lvl5pPr>
-            <a:lvl6pPr marL="2631186" indent="0" algn="ctr">
+            <a:lvl6pPr marL="2489911" indent="0" algn="ctr">
               <a:buNone/>
               <a:defRPr>
                 <a:solidFill>
@@ -231,7 +231,7 @@
                 </a:solidFill>
               </a:defRPr>
             </a:lvl6pPr>
-            <a:lvl7pPr marL="3157423" indent="0" algn="ctr">
+            <a:lvl7pPr marL="2987893" indent="0" algn="ctr">
               <a:buNone/>
               <a:defRPr>
                 <a:solidFill>
@@ -241,7 +241,7 @@
                 </a:solidFill>
               </a:defRPr>
             </a:lvl7pPr>
-            <a:lvl8pPr marL="3683660" indent="0" algn="ctr">
+            <a:lvl8pPr marL="3485876" indent="0" algn="ctr">
               <a:buNone/>
               <a:defRPr>
                 <a:solidFill>
@@ -251,7 +251,7 @@
                 </a:solidFill>
               </a:defRPr>
             </a:lvl8pPr>
-            <a:lvl9pPr marL="4209898" indent="0" algn="ctr">
+            <a:lvl9pPr marL="3983858" indent="0" algn="ctr">
               <a:buNone/>
               <a:defRPr>
                 <a:solidFill>
@@ -548,8 +548,8 @@
         </p:nvSpPr>
         <p:spPr>
           <a:xfrm>
-            <a:off x="11850052" y="428427"/>
-            <a:ext cx="3677604" cy="9128109"/>
+            <a:off x="8402515" y="302867"/>
+            <a:ext cx="2607678" cy="6452932"/>
           </a:xfrm>
         </p:spPr>
         <p:txBody>
@@ -576,8 +576,8 @@
         </p:nvSpPr>
         <p:spPr>
           <a:xfrm>
-            <a:off x="817249" y="428427"/>
-            <a:ext cx="10781349" cy="9128109"/>
+            <a:off x="579485" y="302867"/>
+            <a:ext cx="7644730" cy="6452932"/>
           </a:xfrm>
         </p:spPr>
         <p:txBody>
@@ -898,15 +898,15 @@
         </p:nvSpPr>
         <p:spPr>
           <a:xfrm>
-            <a:off x="1191817" y="6874563"/>
-            <a:ext cx="12824460" cy="2124774"/>
+            <a:off x="845081" y="4859833"/>
+            <a:ext cx="9093439" cy="1502066"/>
           </a:xfrm>
         </p:spPr>
         <p:txBody>
           <a:bodyPr anchor="t"/>
           <a:lstStyle>
             <a:lvl1pPr algn="l">
-              <a:defRPr sz="4600" b="1" cap="all"/>
+              <a:defRPr sz="4400" b="1" cap="all"/>
             </a:lvl1pPr>
           </a:lstStyle>
           <a:p>
@@ -930,8 +930,8 @@
         </p:nvSpPr>
         <p:spPr>
           <a:xfrm>
-            <a:off x="1191817" y="4534341"/>
-            <a:ext cx="12824460" cy="2340223"/>
+            <a:off x="845081" y="3205460"/>
+            <a:ext cx="9093439" cy="1654373"/>
           </a:xfrm>
         </p:spPr>
         <p:txBody>
@@ -939,7 +939,7 @@
           <a:lstStyle>
             <a:lvl1pPr marL="0" indent="0">
               <a:buNone/>
-              <a:defRPr sz="2300">
+              <a:defRPr sz="2200">
                 <a:solidFill>
                   <a:schemeClr val="tx1">
                     <a:tint val="75000"/>
@@ -947,9 +947,9 @@
                 </a:solidFill>
               </a:defRPr>
             </a:lvl1pPr>
-            <a:lvl2pPr marL="526237" indent="0">
+            <a:lvl2pPr marL="497982" indent="0">
               <a:buNone/>
-              <a:defRPr sz="2100">
+              <a:defRPr sz="2000">
                 <a:solidFill>
                   <a:schemeClr val="tx1">
                     <a:tint val="75000"/>
@@ -957,9 +957,9 @@
                 </a:solidFill>
               </a:defRPr>
             </a:lvl2pPr>
-            <a:lvl3pPr marL="1052474" indent="0">
+            <a:lvl3pPr marL="995964" indent="0">
               <a:buNone/>
-              <a:defRPr sz="1800">
+              <a:defRPr sz="1700">
                 <a:solidFill>
                   <a:schemeClr val="tx1">
                     <a:tint val="75000"/>
@@ -967,9 +967,9 @@
                 </a:solidFill>
               </a:defRPr>
             </a:lvl3pPr>
-            <a:lvl4pPr marL="1578712" indent="0">
+            <a:lvl4pPr marL="1493947" indent="0">
               <a:buNone/>
-              <a:defRPr sz="1600">
+              <a:defRPr sz="1500">
                 <a:solidFill>
                   <a:schemeClr val="tx1">
                     <a:tint val="75000"/>
@@ -977,9 +977,9 @@
                 </a:solidFill>
               </a:defRPr>
             </a:lvl4pPr>
-            <a:lvl5pPr marL="2104949" indent="0">
+            <a:lvl5pPr marL="1991929" indent="0">
               <a:buNone/>
-              <a:defRPr sz="1600">
+              <a:defRPr sz="1500">
                 <a:solidFill>
                   <a:schemeClr val="tx1">
                     <a:tint val="75000"/>
@@ -987,9 +987,9 @@
                 </a:solidFill>
               </a:defRPr>
             </a:lvl5pPr>
-            <a:lvl6pPr marL="2631186" indent="0">
+            <a:lvl6pPr marL="2489911" indent="0">
               <a:buNone/>
-              <a:defRPr sz="1600">
+              <a:defRPr sz="1500">
                 <a:solidFill>
                   <a:schemeClr val="tx1">
                     <a:tint val="75000"/>
@@ -997,9 +997,9 @@
                 </a:solidFill>
               </a:defRPr>
             </a:lvl6pPr>
-            <a:lvl7pPr marL="3157423" indent="0">
+            <a:lvl7pPr marL="2987893" indent="0">
               <a:buNone/>
-              <a:defRPr sz="1600">
+              <a:defRPr sz="1500">
                 <a:solidFill>
                   <a:schemeClr val="tx1">
                     <a:tint val="75000"/>
@@ -1007,9 +1007,9 @@
                 </a:solidFill>
               </a:defRPr>
             </a:lvl7pPr>
-            <a:lvl8pPr marL="3683660" indent="0">
+            <a:lvl8pPr marL="3485876" indent="0">
               <a:buNone/>
-              <a:defRPr sz="1600">
+              <a:defRPr sz="1500">
                 <a:solidFill>
                   <a:schemeClr val="tx1">
                     <a:tint val="75000"/>
@@ -1017,9 +1017,9 @@
                 </a:solidFill>
               </a:defRPr>
             </a:lvl8pPr>
-            <a:lvl9pPr marL="4209898" indent="0">
+            <a:lvl9pPr marL="3983858" indent="0">
               <a:buNone/>
-              <a:defRPr sz="1600">
+              <a:defRPr sz="1500">
                 <a:solidFill>
                   <a:schemeClr val="tx1">
                     <a:tint val="75000"/>
@@ -1167,39 +1167,39 @@
         </p:nvSpPr>
         <p:spPr>
           <a:xfrm>
-            <a:off x="817249" y="2496240"/>
-            <a:ext cx="7229475" cy="7060293"/>
+            <a:off x="579486" y="1764667"/>
+            <a:ext cx="5126203" cy="4991131"/>
           </a:xfrm>
         </p:spPr>
         <p:txBody>
           <a:bodyPr/>
           <a:lstStyle>
             <a:lvl1pPr>
-              <a:defRPr sz="3200"/>
+              <a:defRPr sz="3000"/>
             </a:lvl1pPr>
             <a:lvl2pPr>
-              <a:defRPr sz="2800"/>
+              <a:defRPr sz="2600"/>
             </a:lvl2pPr>
             <a:lvl3pPr>
-              <a:defRPr sz="2300"/>
+              <a:defRPr sz="2200"/>
             </a:lvl3pPr>
             <a:lvl4pPr>
-              <a:defRPr sz="2100"/>
+              <a:defRPr sz="2000"/>
             </a:lvl4pPr>
             <a:lvl5pPr>
-              <a:defRPr sz="2100"/>
+              <a:defRPr sz="2000"/>
             </a:lvl5pPr>
             <a:lvl6pPr>
-              <a:defRPr sz="2100"/>
+              <a:defRPr sz="2000"/>
             </a:lvl6pPr>
             <a:lvl7pPr>
-              <a:defRPr sz="2100"/>
+              <a:defRPr sz="2000"/>
             </a:lvl7pPr>
             <a:lvl8pPr>
-              <a:defRPr sz="2100"/>
+              <a:defRPr sz="2000"/>
             </a:lvl8pPr>
             <a:lvl9pPr>
-              <a:defRPr sz="2100"/>
+              <a:defRPr sz="2000"/>
             </a:lvl9pPr>
           </a:lstStyle>
           <a:p>
@@ -1252,39 +1252,39 @@
         </p:nvSpPr>
         <p:spPr>
           <a:xfrm>
-            <a:off x="8298184" y="2496240"/>
-            <a:ext cx="7229475" cy="7060293"/>
+            <a:off x="5883991" y="1764667"/>
+            <a:ext cx="5126203" cy="4991131"/>
           </a:xfrm>
         </p:spPr>
         <p:txBody>
           <a:bodyPr/>
           <a:lstStyle>
             <a:lvl1pPr>
-              <a:defRPr sz="3200"/>
+              <a:defRPr sz="3000"/>
             </a:lvl1pPr>
             <a:lvl2pPr>
-              <a:defRPr sz="2800"/>
+              <a:defRPr sz="2600"/>
             </a:lvl2pPr>
             <a:lvl3pPr>
-              <a:defRPr sz="2300"/>
+              <a:defRPr sz="2200"/>
             </a:lvl3pPr>
             <a:lvl4pPr>
-              <a:defRPr sz="2100"/>
+              <a:defRPr sz="2000"/>
             </a:lvl4pPr>
             <a:lvl5pPr>
-              <a:defRPr sz="2100"/>
+              <a:defRPr sz="2000"/>
             </a:lvl5pPr>
             <a:lvl6pPr>
-              <a:defRPr sz="2100"/>
+              <a:defRPr sz="2000"/>
             </a:lvl6pPr>
             <a:lvl7pPr>
-              <a:defRPr sz="2100"/>
+              <a:defRPr sz="2000"/>
             </a:lvl7pPr>
             <a:lvl8pPr>
-              <a:defRPr sz="2100"/>
+              <a:defRPr sz="2000"/>
             </a:lvl8pPr>
             <a:lvl9pPr>
-              <a:defRPr sz="2100"/>
+              <a:defRPr sz="2000"/>
             </a:lvl9pPr>
           </a:lstStyle>
           <a:p>
@@ -1432,8 +1432,8 @@
         </p:nvSpPr>
         <p:spPr>
           <a:xfrm>
-            <a:off x="754380" y="428422"/>
-            <a:ext cx="13578840" cy="1783027"/>
+            <a:off x="534908" y="302865"/>
+            <a:ext cx="9628347" cy="1260475"/>
           </a:xfrm>
         </p:spPr>
         <p:txBody>
@@ -1464,8 +1464,8 @@
         </p:nvSpPr>
         <p:spPr>
           <a:xfrm>
-            <a:off x="754384" y="2394706"/>
-            <a:ext cx="6666310" cy="997999"/>
+            <a:off x="534909" y="1692889"/>
+            <a:ext cx="4726880" cy="705515"/>
           </a:xfrm>
         </p:spPr>
         <p:txBody>
@@ -1473,39 +1473,39 @@
           <a:lstStyle>
             <a:lvl1pPr marL="0" indent="0">
               <a:buNone/>
-              <a:defRPr sz="2800" b="1"/>
+              <a:defRPr sz="2600" b="1"/>
             </a:lvl1pPr>
-            <a:lvl2pPr marL="526237" indent="0">
+            <a:lvl2pPr marL="497982" indent="0">
               <a:buNone/>
-              <a:defRPr sz="2300" b="1"/>
+              <a:defRPr sz="2200" b="1"/>
             </a:lvl2pPr>
-            <a:lvl3pPr marL="1052474" indent="0">
+            <a:lvl3pPr marL="995964" indent="0">
               <a:buNone/>
-              <a:defRPr sz="2100" b="1"/>
+              <a:defRPr sz="2000" b="1"/>
             </a:lvl3pPr>
-            <a:lvl4pPr marL="1578712" indent="0">
+            <a:lvl4pPr marL="1493947" indent="0">
               <a:buNone/>
-              <a:defRPr sz="1800" b="1"/>
+              <a:defRPr sz="1700" b="1"/>
             </a:lvl4pPr>
-            <a:lvl5pPr marL="2104949" indent="0">
+            <a:lvl5pPr marL="1991929" indent="0">
               <a:buNone/>
-              <a:defRPr sz="1800" b="1"/>
+              <a:defRPr sz="1700" b="1"/>
             </a:lvl5pPr>
-            <a:lvl6pPr marL="2631186" indent="0">
+            <a:lvl6pPr marL="2489911" indent="0">
               <a:buNone/>
-              <a:defRPr sz="1800" b="1"/>
+              <a:defRPr sz="1700" b="1"/>
             </a:lvl6pPr>
-            <a:lvl7pPr marL="3157423" indent="0">
+            <a:lvl7pPr marL="2987893" indent="0">
               <a:buNone/>
-              <a:defRPr sz="1800" b="1"/>
+              <a:defRPr sz="1700" b="1"/>
             </a:lvl7pPr>
-            <a:lvl8pPr marL="3683660" indent="0">
+            <a:lvl8pPr marL="3485876" indent="0">
               <a:buNone/>
-              <a:defRPr sz="1800" b="1"/>
+              <a:defRPr sz="1700" b="1"/>
             </a:lvl8pPr>
-            <a:lvl9pPr marL="4209898" indent="0">
+            <a:lvl9pPr marL="3983858" indent="0">
               <a:buNone/>
-              <a:defRPr sz="1800" b="1"/>
+              <a:defRPr sz="1700" b="1"/>
             </a:lvl9pPr>
           </a:lstStyle>
           <a:p>
@@ -1529,39 +1529,39 @@
         </p:nvSpPr>
         <p:spPr>
           <a:xfrm>
-            <a:off x="754384" y="3392705"/>
-            <a:ext cx="6666310" cy="6163826"/>
+            <a:off x="534909" y="2398404"/>
+            <a:ext cx="4726880" cy="4357393"/>
           </a:xfrm>
         </p:spPr>
         <p:txBody>
           <a:bodyPr/>
           <a:lstStyle>
             <a:lvl1pPr>
-              <a:defRPr sz="2800"/>
+              <a:defRPr sz="2600"/>
             </a:lvl1pPr>
             <a:lvl2pPr>
-              <a:defRPr sz="2300"/>
+              <a:defRPr sz="2200"/>
             </a:lvl2pPr>
             <a:lvl3pPr>
-              <a:defRPr sz="2100"/>
+              <a:defRPr sz="2000"/>
             </a:lvl3pPr>
             <a:lvl4pPr>
-              <a:defRPr sz="1800"/>
+              <a:defRPr sz="1700"/>
             </a:lvl4pPr>
             <a:lvl5pPr>
-              <a:defRPr sz="1800"/>
+              <a:defRPr sz="1700"/>
             </a:lvl5pPr>
             <a:lvl6pPr>
-              <a:defRPr sz="1800"/>
+              <a:defRPr sz="1700"/>
             </a:lvl6pPr>
             <a:lvl7pPr>
-              <a:defRPr sz="1800"/>
+              <a:defRPr sz="1700"/>
             </a:lvl7pPr>
             <a:lvl8pPr>
-              <a:defRPr sz="1800"/>
+              <a:defRPr sz="1700"/>
             </a:lvl8pPr>
             <a:lvl9pPr>
-              <a:defRPr sz="1800"/>
+              <a:defRPr sz="1700"/>
             </a:lvl9pPr>
           </a:lstStyle>
           <a:p>
@@ -1614,8 +1614,8 @@
         </p:nvSpPr>
         <p:spPr>
           <a:xfrm>
-            <a:off x="7664295" y="2394706"/>
-            <a:ext cx="6668930" cy="997999"/>
+            <a:off x="5434519" y="1692889"/>
+            <a:ext cx="4728738" cy="705515"/>
           </a:xfrm>
         </p:spPr>
         <p:txBody>
@@ -1623,39 +1623,39 @@
           <a:lstStyle>
             <a:lvl1pPr marL="0" indent="0">
               <a:buNone/>
-              <a:defRPr sz="2800" b="1"/>
+              <a:defRPr sz="2600" b="1"/>
             </a:lvl1pPr>
-            <a:lvl2pPr marL="526237" indent="0">
+            <a:lvl2pPr marL="497982" indent="0">
               <a:buNone/>
-              <a:defRPr sz="2300" b="1"/>
+              <a:defRPr sz="2200" b="1"/>
             </a:lvl2pPr>
-            <a:lvl3pPr marL="1052474" indent="0">
+            <a:lvl3pPr marL="995964" indent="0">
               <a:buNone/>
-              <a:defRPr sz="2100" b="1"/>
+              <a:defRPr sz="2000" b="1"/>
             </a:lvl3pPr>
-            <a:lvl4pPr marL="1578712" indent="0">
+            <a:lvl4pPr marL="1493947" indent="0">
               <a:buNone/>
-              <a:defRPr sz="1800" b="1"/>
+              <a:defRPr sz="1700" b="1"/>
             </a:lvl4pPr>
-            <a:lvl5pPr marL="2104949" indent="0">
+            <a:lvl5pPr marL="1991929" indent="0">
               <a:buNone/>
-              <a:defRPr sz="1800" b="1"/>
+              <a:defRPr sz="1700" b="1"/>
             </a:lvl5pPr>
-            <a:lvl6pPr marL="2631186" indent="0">
+            <a:lvl6pPr marL="2489911" indent="0">
               <a:buNone/>
-              <a:defRPr sz="1800" b="1"/>
+              <a:defRPr sz="1700" b="1"/>
             </a:lvl6pPr>
-            <a:lvl7pPr marL="3157423" indent="0">
+            <a:lvl7pPr marL="2987893" indent="0">
               <a:buNone/>
-              <a:defRPr sz="1800" b="1"/>
+              <a:defRPr sz="1700" b="1"/>
             </a:lvl7pPr>
-            <a:lvl8pPr marL="3683660" indent="0">
+            <a:lvl8pPr marL="3485876" indent="0">
               <a:buNone/>
-              <a:defRPr sz="1800" b="1"/>
+              <a:defRPr sz="1700" b="1"/>
             </a:lvl8pPr>
-            <a:lvl9pPr marL="4209898" indent="0">
+            <a:lvl9pPr marL="3983858" indent="0">
               <a:buNone/>
-              <a:defRPr sz="1800" b="1"/>
+              <a:defRPr sz="1700" b="1"/>
             </a:lvl9pPr>
           </a:lstStyle>
           <a:p>
@@ -1679,39 +1679,39 @@
         </p:nvSpPr>
         <p:spPr>
           <a:xfrm>
-            <a:off x="7664295" y="3392705"/>
-            <a:ext cx="6668930" cy="6163826"/>
+            <a:off x="5434519" y="2398404"/>
+            <a:ext cx="4728738" cy="4357393"/>
           </a:xfrm>
         </p:spPr>
         <p:txBody>
           <a:bodyPr/>
           <a:lstStyle>
             <a:lvl1pPr>
-              <a:defRPr sz="2800"/>
+              <a:defRPr sz="2600"/>
             </a:lvl1pPr>
             <a:lvl2pPr>
-              <a:defRPr sz="2300"/>
+              <a:defRPr sz="2200"/>
             </a:lvl2pPr>
             <a:lvl3pPr>
-              <a:defRPr sz="2100"/>
+              <a:defRPr sz="2000"/>
             </a:lvl3pPr>
             <a:lvl4pPr>
-              <a:defRPr sz="1800"/>
+              <a:defRPr sz="1700"/>
             </a:lvl4pPr>
             <a:lvl5pPr>
-              <a:defRPr sz="1800"/>
+              <a:defRPr sz="1700"/>
             </a:lvl5pPr>
             <a:lvl6pPr>
-              <a:defRPr sz="1800"/>
+              <a:defRPr sz="1700"/>
             </a:lvl6pPr>
             <a:lvl7pPr>
-              <a:defRPr sz="1800"/>
+              <a:defRPr sz="1700"/>
             </a:lvl7pPr>
             <a:lvl8pPr>
-              <a:defRPr sz="1800"/>
+              <a:defRPr sz="1700"/>
             </a:lvl8pPr>
             <a:lvl9pPr>
-              <a:defRPr sz="1800"/>
+              <a:defRPr sz="1700"/>
             </a:lvl9pPr>
           </a:lstStyle>
           <a:p>
@@ -2072,15 +2072,15 @@
         </p:nvSpPr>
         <p:spPr>
           <a:xfrm>
-            <a:off x="754384" y="425946"/>
-            <a:ext cx="4963717" cy="1812744"/>
+            <a:off x="534909" y="301113"/>
+            <a:ext cx="3519622" cy="1281483"/>
           </a:xfrm>
         </p:spPr>
         <p:txBody>
           <a:bodyPr anchor="b"/>
           <a:lstStyle>
             <a:lvl1pPr algn="l">
-              <a:defRPr sz="2300" b="1"/>
+              <a:defRPr sz="2200" b="1"/>
             </a:lvl1pPr>
           </a:lstStyle>
           <a:p>
@@ -2104,39 +2104,39 @@
         </p:nvSpPr>
         <p:spPr>
           <a:xfrm>
-            <a:off x="5898834" y="425950"/>
-            <a:ext cx="8434386" cy="9130587"/>
+            <a:off x="4182686" y="301116"/>
+            <a:ext cx="5980569" cy="6454683"/>
           </a:xfrm>
         </p:spPr>
         <p:txBody>
           <a:bodyPr/>
           <a:lstStyle>
             <a:lvl1pPr>
-              <a:defRPr sz="3700"/>
+              <a:defRPr sz="3500"/>
             </a:lvl1pPr>
             <a:lvl2pPr>
-              <a:defRPr sz="3200"/>
+              <a:defRPr sz="3000"/>
             </a:lvl2pPr>
             <a:lvl3pPr>
-              <a:defRPr sz="2800"/>
+              <a:defRPr sz="2600"/>
             </a:lvl3pPr>
             <a:lvl4pPr>
-              <a:defRPr sz="2300"/>
+              <a:defRPr sz="2200"/>
             </a:lvl4pPr>
             <a:lvl5pPr>
-              <a:defRPr sz="2300"/>
+              <a:defRPr sz="2200"/>
             </a:lvl5pPr>
             <a:lvl6pPr>
-              <a:defRPr sz="2300"/>
+              <a:defRPr sz="2200"/>
             </a:lvl6pPr>
             <a:lvl7pPr>
-              <a:defRPr sz="2300"/>
+              <a:defRPr sz="2200"/>
             </a:lvl7pPr>
             <a:lvl8pPr>
-              <a:defRPr sz="2300"/>
+              <a:defRPr sz="2200"/>
             </a:lvl8pPr>
             <a:lvl9pPr>
-              <a:defRPr sz="2300"/>
+              <a:defRPr sz="2200"/>
             </a:lvl9pPr>
           </a:lstStyle>
           <a:p>
@@ -2189,8 +2189,8 @@
         </p:nvSpPr>
         <p:spPr>
           <a:xfrm>
-            <a:off x="754384" y="2238692"/>
-            <a:ext cx="4963717" cy="7317841"/>
+            <a:off x="534909" y="1582598"/>
+            <a:ext cx="3519622" cy="5173200"/>
           </a:xfrm>
         </p:spPr>
         <p:txBody>
@@ -2198,37 +2198,37 @@
           <a:lstStyle>
             <a:lvl1pPr marL="0" indent="0">
               <a:buNone/>
-              <a:defRPr sz="1600"/>
+              <a:defRPr sz="1500"/>
             </a:lvl1pPr>
-            <a:lvl2pPr marL="526237" indent="0">
+            <a:lvl2pPr marL="497982" indent="0">
               <a:buNone/>
-              <a:defRPr sz="1400"/>
+              <a:defRPr sz="1300"/>
             </a:lvl2pPr>
-            <a:lvl3pPr marL="1052474" indent="0">
+            <a:lvl3pPr marL="995964" indent="0">
               <a:buNone/>
-              <a:defRPr sz="1200"/>
+              <a:defRPr sz="1100"/>
             </a:lvl3pPr>
-            <a:lvl4pPr marL="1578712" indent="0">
+            <a:lvl4pPr marL="1493947" indent="0">
               <a:buNone/>
               <a:defRPr sz="1000"/>
             </a:lvl4pPr>
-            <a:lvl5pPr marL="2104949" indent="0">
+            <a:lvl5pPr marL="1991929" indent="0">
               <a:buNone/>
               <a:defRPr sz="1000"/>
             </a:lvl5pPr>
-            <a:lvl6pPr marL="2631186" indent="0">
+            <a:lvl6pPr marL="2489911" indent="0">
               <a:buNone/>
               <a:defRPr sz="1000"/>
             </a:lvl6pPr>
-            <a:lvl7pPr marL="3157423" indent="0">
+            <a:lvl7pPr marL="2987893" indent="0">
               <a:buNone/>
               <a:defRPr sz="1000"/>
             </a:lvl7pPr>
-            <a:lvl8pPr marL="3683660" indent="0">
+            <a:lvl8pPr marL="3485876" indent="0">
               <a:buNone/>
               <a:defRPr sz="1000"/>
             </a:lvl8pPr>
-            <a:lvl9pPr marL="4209898" indent="0">
+            <a:lvl9pPr marL="3983858" indent="0">
               <a:buNone/>
               <a:defRPr sz="1000"/>
             </a:lvl9pPr>
@@ -2349,15 +2349,15 @@
         </p:nvSpPr>
         <p:spPr>
           <a:xfrm>
-            <a:off x="2957275" y="7488714"/>
-            <a:ext cx="9052560" cy="884086"/>
+            <a:off x="2096914" y="5293995"/>
+            <a:ext cx="6418898" cy="624986"/>
           </a:xfrm>
         </p:spPr>
         <p:txBody>
           <a:bodyPr anchor="b"/>
           <a:lstStyle>
             <a:lvl1pPr algn="l">
-              <a:defRPr sz="2300" b="1"/>
+              <a:defRPr sz="2200" b="1"/>
             </a:lvl1pPr>
           </a:lstStyle>
           <a:p>
@@ -2381,8 +2381,8 @@
         </p:nvSpPr>
         <p:spPr>
           <a:xfrm>
-            <a:off x="2957275" y="955901"/>
-            <a:ext cx="9052560" cy="6418898"/>
+            <a:off x="2096914" y="675755"/>
+            <a:ext cx="6418898" cy="4537710"/>
           </a:xfrm>
         </p:spPr>
         <p:txBody>
@@ -2390,39 +2390,39 @@
           <a:lstStyle>
             <a:lvl1pPr marL="0" indent="0">
               <a:buNone/>
-              <a:defRPr sz="3700"/>
+              <a:defRPr sz="3500"/>
             </a:lvl1pPr>
-            <a:lvl2pPr marL="526237" indent="0">
+            <a:lvl2pPr marL="497982" indent="0">
               <a:buNone/>
-              <a:defRPr sz="3200"/>
+              <a:defRPr sz="3000"/>
             </a:lvl2pPr>
-            <a:lvl3pPr marL="1052474" indent="0">
+            <a:lvl3pPr marL="995964" indent="0">
               <a:buNone/>
-              <a:defRPr sz="2800"/>
+              <a:defRPr sz="2600"/>
             </a:lvl3pPr>
-            <a:lvl4pPr marL="1578712" indent="0">
+            <a:lvl4pPr marL="1493947" indent="0">
               <a:buNone/>
-              <a:defRPr sz="2300"/>
+              <a:defRPr sz="2200"/>
             </a:lvl4pPr>
-            <a:lvl5pPr marL="2104949" indent="0">
+            <a:lvl5pPr marL="1991929" indent="0">
               <a:buNone/>
-              <a:defRPr sz="2300"/>
+              <a:defRPr sz="2200"/>
             </a:lvl5pPr>
-            <a:lvl6pPr marL="2631186" indent="0">
+            <a:lvl6pPr marL="2489911" indent="0">
               <a:buNone/>
-              <a:defRPr sz="2300"/>
+              <a:defRPr sz="2200"/>
             </a:lvl6pPr>
-            <a:lvl7pPr marL="3157423" indent="0">
+            <a:lvl7pPr marL="2987893" indent="0">
               <a:buNone/>
-              <a:defRPr sz="2300"/>
+              <a:defRPr sz="2200"/>
             </a:lvl7pPr>
-            <a:lvl8pPr marL="3683660" indent="0">
+            <a:lvl8pPr marL="3485876" indent="0">
               <a:buNone/>
-              <a:defRPr sz="2300"/>
+              <a:defRPr sz="2200"/>
             </a:lvl8pPr>
-            <a:lvl9pPr marL="4209898" indent="0">
+            <a:lvl9pPr marL="3983858" indent="0">
               <a:buNone/>
-              <a:defRPr sz="2300"/>
+              <a:defRPr sz="2200"/>
             </a:lvl9pPr>
           </a:lstStyle>
           <a:p>
@@ -2442,8 +2442,8 @@
         </p:nvSpPr>
         <p:spPr>
           <a:xfrm>
-            <a:off x="2957275" y="8372800"/>
-            <a:ext cx="9052560" cy="1255547"/>
+            <a:off x="2096914" y="5918981"/>
+            <a:ext cx="6418898" cy="887584"/>
           </a:xfrm>
         </p:spPr>
         <p:txBody>
@@ -2451,37 +2451,37 @@
           <a:lstStyle>
             <a:lvl1pPr marL="0" indent="0">
               <a:buNone/>
-              <a:defRPr sz="1600"/>
+              <a:defRPr sz="1500"/>
             </a:lvl1pPr>
-            <a:lvl2pPr marL="526237" indent="0">
+            <a:lvl2pPr marL="497982" indent="0">
               <a:buNone/>
-              <a:defRPr sz="1400"/>
+              <a:defRPr sz="1300"/>
             </a:lvl2pPr>
-            <a:lvl3pPr marL="1052474" indent="0">
+            <a:lvl3pPr marL="995964" indent="0">
               <a:buNone/>
-              <a:defRPr sz="1200"/>
+              <a:defRPr sz="1100"/>
             </a:lvl3pPr>
-            <a:lvl4pPr marL="1578712" indent="0">
+            <a:lvl4pPr marL="1493947" indent="0">
               <a:buNone/>
               <a:defRPr sz="1000"/>
             </a:lvl4pPr>
-            <a:lvl5pPr marL="2104949" indent="0">
+            <a:lvl5pPr marL="1991929" indent="0">
               <a:buNone/>
               <a:defRPr sz="1000"/>
             </a:lvl5pPr>
-            <a:lvl6pPr marL="2631186" indent="0">
+            <a:lvl6pPr marL="2489911" indent="0">
               <a:buNone/>
               <a:defRPr sz="1000"/>
             </a:lvl6pPr>
-            <a:lvl7pPr marL="3157423" indent="0">
+            <a:lvl7pPr marL="2987893" indent="0">
               <a:buNone/>
               <a:defRPr sz="1000"/>
             </a:lvl7pPr>
-            <a:lvl8pPr marL="3683660" indent="0">
+            <a:lvl8pPr marL="3485876" indent="0">
               <a:buNone/>
               <a:defRPr sz="1000"/>
             </a:lvl8pPr>
-            <a:lvl9pPr marL="4209898" indent="0">
+            <a:lvl9pPr marL="3983858" indent="0">
               <a:buNone/>
               <a:defRPr sz="1000"/>
             </a:lvl9pPr>
@@ -2607,15 +2607,15 @@
         </p:nvSpPr>
         <p:spPr>
           <a:xfrm>
-            <a:off x="754380" y="428422"/>
-            <a:ext cx="13578840" cy="1783027"/>
+            <a:off x="534908" y="302865"/>
+            <a:ext cx="9628347" cy="1260475"/>
           </a:xfrm>
           <a:prstGeom prst="rect">
             <a:avLst/>
           </a:prstGeom>
         </p:spPr>
         <p:txBody>
-          <a:bodyPr vert="horz" lIns="105247" tIns="52624" rIns="105247" bIns="52624" rtlCol="0" anchor="ctr">
+          <a:bodyPr vert="horz" lIns="99596" tIns="49798" rIns="99596" bIns="49798" rtlCol="0" anchor="ctr">
             <a:normAutofit/>
           </a:bodyPr>
           <a:lstStyle/>
@@ -2640,15 +2640,15 @@
         </p:nvSpPr>
         <p:spPr>
           <a:xfrm>
-            <a:off x="754380" y="2496240"/>
-            <a:ext cx="13578840" cy="7060293"/>
+            <a:off x="534908" y="1764667"/>
+            <a:ext cx="9628347" cy="4991131"/>
           </a:xfrm>
           <a:prstGeom prst="rect">
             <a:avLst/>
           </a:prstGeom>
         </p:spPr>
         <p:txBody>
-          <a:bodyPr vert="horz" lIns="105247" tIns="52624" rIns="105247" bIns="52624" rtlCol="0">
+          <a:bodyPr vert="horz" lIns="99596" tIns="49798" rIns="99596" bIns="49798" rtlCol="0">
             <a:normAutofit/>
           </a:bodyPr>
           <a:lstStyle/>
@@ -2702,18 +2702,18 @@
         </p:nvSpPr>
         <p:spPr>
           <a:xfrm>
-            <a:off x="754380" y="9915617"/>
-            <a:ext cx="3520440" cy="569578"/>
+            <a:off x="534908" y="7009644"/>
+            <a:ext cx="2496238" cy="402652"/>
           </a:xfrm>
           <a:prstGeom prst="rect">
             <a:avLst/>
           </a:prstGeom>
         </p:spPr>
         <p:txBody>
-          <a:bodyPr vert="horz" lIns="105247" tIns="52624" rIns="105247" bIns="52624" rtlCol="0" anchor="ctr"/>
+          <a:bodyPr vert="horz" lIns="99596" tIns="49798" rIns="99596" bIns="49798" rtlCol="0" anchor="ctr"/>
           <a:lstStyle>
             <a:lvl1pPr algn="l">
-              <a:defRPr sz="1400">
+              <a:defRPr sz="1300">
                 <a:solidFill>
                   <a:schemeClr val="tx1">
                     <a:tint val="75000"/>
@@ -2743,18 +2743,18 @@
         </p:nvSpPr>
         <p:spPr>
           <a:xfrm>
-            <a:off x="5154930" y="9915617"/>
-            <a:ext cx="4777740" cy="569578"/>
+            <a:off x="3655206" y="7009644"/>
+            <a:ext cx="3387752" cy="402652"/>
           </a:xfrm>
           <a:prstGeom prst="rect">
             <a:avLst/>
           </a:prstGeom>
         </p:spPr>
         <p:txBody>
-          <a:bodyPr vert="horz" lIns="105247" tIns="52624" rIns="105247" bIns="52624" rtlCol="0" anchor="ctr"/>
+          <a:bodyPr vert="horz" lIns="99596" tIns="49798" rIns="99596" bIns="49798" rtlCol="0" anchor="ctr"/>
           <a:lstStyle>
             <a:lvl1pPr algn="ctr">
-              <a:defRPr sz="1400">
+              <a:defRPr sz="1300">
                 <a:solidFill>
                   <a:schemeClr val="tx1">
                     <a:tint val="75000"/>
@@ -2780,18 +2780,18 @@
         </p:nvSpPr>
         <p:spPr>
           <a:xfrm>
-            <a:off x="10812780" y="9915617"/>
-            <a:ext cx="3520440" cy="569578"/>
+            <a:off x="7667017" y="7009644"/>
+            <a:ext cx="2496238" cy="402652"/>
           </a:xfrm>
           <a:prstGeom prst="rect">
             <a:avLst/>
           </a:prstGeom>
         </p:spPr>
         <p:txBody>
-          <a:bodyPr vert="horz" lIns="105247" tIns="52624" rIns="105247" bIns="52624" rtlCol="0" anchor="ctr"/>
+          <a:bodyPr vert="horz" lIns="99596" tIns="49798" rIns="99596" bIns="49798" rtlCol="0" anchor="ctr"/>
           <a:lstStyle>
             <a:lvl1pPr algn="r">
-              <a:defRPr sz="1400">
+              <a:defRPr sz="1300">
                 <a:solidFill>
                   <a:schemeClr val="tx1">
                     <a:tint val="75000"/>
@@ -2832,12 +2832,12 @@
   </p:sldLayoutIdLst>
   <p:txStyles>
     <p:titleStyle>
-      <a:lvl1pPr algn="ctr" defTabSz="1052474" rtl="0" eaLnBrk="1" latinLnBrk="0" hangingPunct="1">
+      <a:lvl1pPr algn="ctr" defTabSz="995964" rtl="0" eaLnBrk="1" latinLnBrk="0" hangingPunct="1">
         <a:spcBef>
           <a:spcPct val="0"/>
         </a:spcBef>
         <a:buNone/>
-        <a:defRPr sz="5100" kern="1200">
+        <a:defRPr sz="4800" kern="1200">
           <a:solidFill>
             <a:schemeClr val="tx1"/>
           </a:solidFill>
@@ -2848,13 +2848,13 @@
       </a:lvl1pPr>
     </p:titleStyle>
     <p:bodyStyle>
-      <a:lvl1pPr marL="394678" indent="-394678" algn="l" defTabSz="1052474" rtl="0" eaLnBrk="1" latinLnBrk="0" hangingPunct="1">
+      <a:lvl1pPr marL="373487" indent="-373487" algn="l" defTabSz="995964" rtl="0" eaLnBrk="1" latinLnBrk="0" hangingPunct="1">
         <a:spcBef>
           <a:spcPct val="20000"/>
         </a:spcBef>
         <a:buFont typeface="Arial" panose="020B0604020202020204" pitchFamily="34" charset="0"/>
         <a:buChar char="•"/>
-        <a:defRPr sz="3700" kern="1200">
+        <a:defRPr sz="3500" kern="1200">
           <a:solidFill>
             <a:schemeClr val="tx1"/>
           </a:solidFill>
@@ -2863,13 +2863,13 @@
           <a:cs typeface="+mn-cs"/>
         </a:defRPr>
       </a:lvl1pPr>
-      <a:lvl2pPr marL="855135" indent="-328898" algn="l" defTabSz="1052474" rtl="0" eaLnBrk="1" latinLnBrk="0" hangingPunct="1">
+      <a:lvl2pPr marL="809221" indent="-311239" algn="l" defTabSz="995964" rtl="0" eaLnBrk="1" latinLnBrk="0" hangingPunct="1">
         <a:spcBef>
           <a:spcPct val="20000"/>
         </a:spcBef>
         <a:buFont typeface="Arial" panose="020B0604020202020204" pitchFamily="34" charset="0"/>
         <a:buChar char="–"/>
-        <a:defRPr sz="3200" kern="1200">
+        <a:defRPr sz="3000" kern="1200">
           <a:solidFill>
             <a:schemeClr val="tx1"/>
           </a:solidFill>
@@ -2878,13 +2878,13 @@
           <a:cs typeface="+mn-cs"/>
         </a:defRPr>
       </a:lvl2pPr>
-      <a:lvl3pPr marL="1315593" indent="-263119" algn="l" defTabSz="1052474" rtl="0" eaLnBrk="1" latinLnBrk="0" hangingPunct="1">
+      <a:lvl3pPr marL="1244956" indent="-248991" algn="l" defTabSz="995964" rtl="0" eaLnBrk="1" latinLnBrk="0" hangingPunct="1">
         <a:spcBef>
           <a:spcPct val="20000"/>
         </a:spcBef>
         <a:buFont typeface="Arial" panose="020B0604020202020204" pitchFamily="34" charset="0"/>
         <a:buChar char="•"/>
-        <a:defRPr sz="2800" kern="1200">
+        <a:defRPr sz="2600" kern="1200">
           <a:solidFill>
             <a:schemeClr val="tx1"/>
           </a:solidFill>
@@ -2893,13 +2893,13 @@
           <a:cs typeface="+mn-cs"/>
         </a:defRPr>
       </a:lvl3pPr>
-      <a:lvl4pPr marL="1841830" indent="-263119" algn="l" defTabSz="1052474" rtl="0" eaLnBrk="1" latinLnBrk="0" hangingPunct="1">
+      <a:lvl4pPr marL="1742938" indent="-248991" algn="l" defTabSz="995964" rtl="0" eaLnBrk="1" latinLnBrk="0" hangingPunct="1">
         <a:spcBef>
           <a:spcPct val="20000"/>
         </a:spcBef>
         <a:buFont typeface="Arial" panose="020B0604020202020204" pitchFamily="34" charset="0"/>
         <a:buChar char="–"/>
-        <a:defRPr sz="2300" kern="1200">
+        <a:defRPr sz="2200" kern="1200">
           <a:solidFill>
             <a:schemeClr val="tx1"/>
           </a:solidFill>
@@ -2908,13 +2908,13 @@
           <a:cs typeface="+mn-cs"/>
         </a:defRPr>
       </a:lvl4pPr>
-      <a:lvl5pPr marL="2368067" indent="-263119" algn="l" defTabSz="1052474" rtl="0" eaLnBrk="1" latinLnBrk="0" hangingPunct="1">
+      <a:lvl5pPr marL="2240920" indent="-248991" algn="l" defTabSz="995964" rtl="0" eaLnBrk="1" latinLnBrk="0" hangingPunct="1">
         <a:spcBef>
           <a:spcPct val="20000"/>
         </a:spcBef>
         <a:buFont typeface="Arial" panose="020B0604020202020204" pitchFamily="34" charset="0"/>
         <a:buChar char="»"/>
-        <a:defRPr sz="2300" kern="1200">
+        <a:defRPr sz="2200" kern="1200">
           <a:solidFill>
             <a:schemeClr val="tx1"/>
           </a:solidFill>
@@ -2923,13 +2923,13 @@
           <a:cs typeface="+mn-cs"/>
         </a:defRPr>
       </a:lvl5pPr>
-      <a:lvl6pPr marL="2894305" indent="-263119" algn="l" defTabSz="1052474" rtl="0" eaLnBrk="1" latinLnBrk="0" hangingPunct="1">
+      <a:lvl6pPr marL="2738902" indent="-248991" algn="l" defTabSz="995964" rtl="0" eaLnBrk="1" latinLnBrk="0" hangingPunct="1">
         <a:spcBef>
           <a:spcPct val="20000"/>
         </a:spcBef>
         <a:buFont typeface="Arial" panose="020B0604020202020204" pitchFamily="34" charset="0"/>
         <a:buChar char="•"/>
-        <a:defRPr sz="2300" kern="1200">
+        <a:defRPr sz="2200" kern="1200">
           <a:solidFill>
             <a:schemeClr val="tx1"/>
           </a:solidFill>
@@ -2938,13 +2938,13 @@
           <a:cs typeface="+mn-cs"/>
         </a:defRPr>
       </a:lvl6pPr>
-      <a:lvl7pPr marL="3420542" indent="-263119" algn="l" defTabSz="1052474" rtl="0" eaLnBrk="1" latinLnBrk="0" hangingPunct="1">
+      <a:lvl7pPr marL="3236885" indent="-248991" algn="l" defTabSz="995964" rtl="0" eaLnBrk="1" latinLnBrk="0" hangingPunct="1">
         <a:spcBef>
           <a:spcPct val="20000"/>
         </a:spcBef>
         <a:buFont typeface="Arial" panose="020B0604020202020204" pitchFamily="34" charset="0"/>
         <a:buChar char="•"/>
-        <a:defRPr sz="2300" kern="1200">
+        <a:defRPr sz="2200" kern="1200">
           <a:solidFill>
             <a:schemeClr val="tx1"/>
           </a:solidFill>
@@ -2953,13 +2953,13 @@
           <a:cs typeface="+mn-cs"/>
         </a:defRPr>
       </a:lvl7pPr>
-      <a:lvl8pPr marL="3946779" indent="-263119" algn="l" defTabSz="1052474" rtl="0" eaLnBrk="1" latinLnBrk="0" hangingPunct="1">
+      <a:lvl8pPr marL="3734867" indent="-248991" algn="l" defTabSz="995964" rtl="0" eaLnBrk="1" latinLnBrk="0" hangingPunct="1">
         <a:spcBef>
           <a:spcPct val="20000"/>
         </a:spcBef>
         <a:buFont typeface="Arial" panose="020B0604020202020204" pitchFamily="34" charset="0"/>
         <a:buChar char="•"/>
-        <a:defRPr sz="2300" kern="1200">
+        <a:defRPr sz="2200" kern="1200">
           <a:solidFill>
             <a:schemeClr val="tx1"/>
           </a:solidFill>
@@ -2968,13 +2968,13 @@
           <a:cs typeface="+mn-cs"/>
         </a:defRPr>
       </a:lvl8pPr>
-      <a:lvl9pPr marL="4473016" indent="-263119" algn="l" defTabSz="1052474" rtl="0" eaLnBrk="1" latinLnBrk="0" hangingPunct="1">
+      <a:lvl9pPr marL="4232849" indent="-248991" algn="l" defTabSz="995964" rtl="0" eaLnBrk="1" latinLnBrk="0" hangingPunct="1">
         <a:spcBef>
           <a:spcPct val="20000"/>
         </a:spcBef>
         <a:buFont typeface="Arial" panose="020B0604020202020204" pitchFamily="34" charset="0"/>
         <a:buChar char="•"/>
-        <a:defRPr sz="2300" kern="1200">
+        <a:defRPr sz="2200" kern="1200">
           <a:solidFill>
             <a:schemeClr val="tx1"/>
           </a:solidFill>
@@ -2988,8 +2988,8 @@
       <a:defPPr>
         <a:defRPr lang="en-US"/>
       </a:defPPr>
-      <a:lvl1pPr marL="0" algn="l" defTabSz="1052474" rtl="0" eaLnBrk="1" latinLnBrk="0" hangingPunct="1">
-        <a:defRPr sz="2100" kern="1200">
+      <a:lvl1pPr marL="0" algn="l" defTabSz="995964" rtl="0" eaLnBrk="1" latinLnBrk="0" hangingPunct="1">
+        <a:defRPr sz="2000" kern="1200">
           <a:solidFill>
             <a:schemeClr val="tx1"/>
           </a:solidFill>
@@ -2998,8 +2998,8 @@
           <a:cs typeface="+mn-cs"/>
         </a:defRPr>
       </a:lvl1pPr>
-      <a:lvl2pPr marL="526237" algn="l" defTabSz="1052474" rtl="0" eaLnBrk="1" latinLnBrk="0" hangingPunct="1">
-        <a:defRPr sz="2100" kern="1200">
+      <a:lvl2pPr marL="497982" algn="l" defTabSz="995964" rtl="0" eaLnBrk="1" latinLnBrk="0" hangingPunct="1">
+        <a:defRPr sz="2000" kern="1200">
           <a:solidFill>
             <a:schemeClr val="tx1"/>
           </a:solidFill>
@@ -3008,8 +3008,8 @@
           <a:cs typeface="+mn-cs"/>
         </a:defRPr>
       </a:lvl2pPr>
-      <a:lvl3pPr marL="1052474" algn="l" defTabSz="1052474" rtl="0" eaLnBrk="1" latinLnBrk="0" hangingPunct="1">
-        <a:defRPr sz="2100" kern="1200">
+      <a:lvl3pPr marL="995964" algn="l" defTabSz="995964" rtl="0" eaLnBrk="1" latinLnBrk="0" hangingPunct="1">
+        <a:defRPr sz="2000" kern="1200">
           <a:solidFill>
             <a:schemeClr val="tx1"/>
           </a:solidFill>
@@ -3018,8 +3018,8 @@
           <a:cs typeface="+mn-cs"/>
         </a:defRPr>
       </a:lvl3pPr>
-      <a:lvl4pPr marL="1578712" algn="l" defTabSz="1052474" rtl="0" eaLnBrk="1" latinLnBrk="0" hangingPunct="1">
-        <a:defRPr sz="2100" kern="1200">
+      <a:lvl4pPr marL="1493947" algn="l" defTabSz="995964" rtl="0" eaLnBrk="1" latinLnBrk="0" hangingPunct="1">
+        <a:defRPr sz="2000" kern="1200">
           <a:solidFill>
             <a:schemeClr val="tx1"/>
           </a:solidFill>
@@ -3028,8 +3028,8 @@
           <a:cs typeface="+mn-cs"/>
         </a:defRPr>
       </a:lvl4pPr>
-      <a:lvl5pPr marL="2104949" algn="l" defTabSz="1052474" rtl="0" eaLnBrk="1" latinLnBrk="0" hangingPunct="1">
-        <a:defRPr sz="2100" kern="1200">
+      <a:lvl5pPr marL="1991929" algn="l" defTabSz="995964" rtl="0" eaLnBrk="1" latinLnBrk="0" hangingPunct="1">
+        <a:defRPr sz="2000" kern="1200">
           <a:solidFill>
             <a:schemeClr val="tx1"/>
           </a:solidFill>
@@ -3038,8 +3038,8 @@
           <a:cs typeface="+mn-cs"/>
         </a:defRPr>
       </a:lvl5pPr>
-      <a:lvl6pPr marL="2631186" algn="l" defTabSz="1052474" rtl="0" eaLnBrk="1" latinLnBrk="0" hangingPunct="1">
-        <a:defRPr sz="2100" kern="1200">
+      <a:lvl6pPr marL="2489911" algn="l" defTabSz="995964" rtl="0" eaLnBrk="1" latinLnBrk="0" hangingPunct="1">
+        <a:defRPr sz="2000" kern="1200">
           <a:solidFill>
             <a:schemeClr val="tx1"/>
           </a:solidFill>
@@ -3048,8 +3048,8 @@
           <a:cs typeface="+mn-cs"/>
         </a:defRPr>
       </a:lvl6pPr>
-      <a:lvl7pPr marL="3157423" algn="l" defTabSz="1052474" rtl="0" eaLnBrk="1" latinLnBrk="0" hangingPunct="1">
-        <a:defRPr sz="2100" kern="1200">
+      <a:lvl7pPr marL="2987893" algn="l" defTabSz="995964" rtl="0" eaLnBrk="1" latinLnBrk="0" hangingPunct="1">
+        <a:defRPr sz="2000" kern="1200">
           <a:solidFill>
             <a:schemeClr val="tx1"/>
           </a:solidFill>
@@ -3058,8 +3058,8 @@
           <a:cs typeface="+mn-cs"/>
         </a:defRPr>
       </a:lvl7pPr>
-      <a:lvl8pPr marL="3683660" algn="l" defTabSz="1052474" rtl="0" eaLnBrk="1" latinLnBrk="0" hangingPunct="1">
-        <a:defRPr sz="2100" kern="1200">
+      <a:lvl8pPr marL="3485876" algn="l" defTabSz="995964" rtl="0" eaLnBrk="1" latinLnBrk="0" hangingPunct="1">
+        <a:defRPr sz="2000" kern="1200">
           <a:solidFill>
             <a:schemeClr val="tx1"/>
           </a:solidFill>
@@ -3068,8 +3068,8 @@
           <a:cs typeface="+mn-cs"/>
         </a:defRPr>
       </a:lvl8pPr>
-      <a:lvl9pPr marL="4209898" algn="l" defTabSz="1052474" rtl="0" eaLnBrk="1" latinLnBrk="0" hangingPunct="1">
-        <a:defRPr sz="2100" kern="1200">
+      <a:lvl9pPr marL="3983858" algn="l" defTabSz="995964" rtl="0" eaLnBrk="1" latinLnBrk="0" hangingPunct="1">
+        <a:defRPr sz="2000" kern="1200">
           <a:solidFill>
             <a:schemeClr val="tx1"/>
           </a:solidFill>
@@ -3108,10 +3108,10 @@
         </p:nvGrpSpPr>
         <p:grpSpPr>
           <a:xfrm>
-            <a:off x="4800600" y="1691481"/>
-            <a:ext cx="5486400" cy="7315200"/>
-            <a:chOff x="4800600" y="1691481"/>
-            <a:chExt cx="5486400" cy="7315200"/>
+            <a:off x="2605882" y="581025"/>
+            <a:ext cx="5486400" cy="6400800"/>
+            <a:chOff x="2605882" y="581025"/>
+            <a:chExt cx="5486400" cy="6400800"/>
           </a:xfrm>
         </p:grpSpPr>
         <p:sp>
@@ -3122,8 +3122,8 @@
           </p:nvSpPr>
           <p:spPr>
             <a:xfrm>
-              <a:off x="4800600" y="1691481"/>
-              <a:ext cx="5486400" cy="7315200"/>
+              <a:off x="2605881" y="581025"/>
+              <a:ext cx="5486400" cy="6400800"/>
             </a:xfrm>
             <a:prstGeom prst="rect">
               <a:avLst/>
@@ -3157,8 +3157,8 @@
           </p:nvSpPr>
           <p:spPr>
             <a:xfrm>
-              <a:off x="4800600" y="1691481"/>
-              <a:ext cx="5486399" cy="3657600"/>
+              <a:off x="2605881" y="581025"/>
+              <a:ext cx="5486399" cy="3200399"/>
             </a:xfrm>
             <a:prstGeom prst="rect">
               <a:avLst/>
@@ -3183,7 +3183,7 @@
           </p:nvSpPr>
           <p:spPr>
             <a:xfrm>
-              <a:off x="5251456" y="3425709"/>
+              <a:off x="3056738" y="2086652"/>
               <a:ext cx="4965954" cy="0"/>
             </a:xfrm>
             <a:custGeom>
@@ -3226,7 +3226,7 @@
           </p:nvSpPr>
           <p:spPr>
             <a:xfrm>
-              <a:off x="5251456" y="3000087"/>
+              <a:off x="3056738" y="1742481"/>
               <a:ext cx="4965954" cy="0"/>
             </a:xfrm>
             <a:custGeom>
@@ -3269,7 +3269,7 @@
           </p:nvSpPr>
           <p:spPr>
             <a:xfrm>
-              <a:off x="5251456" y="2736571"/>
+              <a:off x="3056738" y="1529394"/>
               <a:ext cx="4965954" cy="0"/>
             </a:xfrm>
             <a:custGeom>
@@ -3312,7 +3312,7 @@
           </p:nvSpPr>
           <p:spPr>
             <a:xfrm>
-              <a:off x="5251456" y="2538171"/>
+              <a:off x="3056738" y="1368961"/>
               <a:ext cx="4965954" cy="0"/>
             </a:xfrm>
             <a:custGeom>
@@ -3355,7 +3355,7 @@
           </p:nvSpPr>
           <p:spPr>
             <a:xfrm>
-              <a:off x="5251456" y="2374304"/>
+              <a:off x="3056738" y="1236453"/>
               <a:ext cx="4965954" cy="0"/>
             </a:xfrm>
             <a:custGeom>
@@ -3398,7 +3398,7 @@
           </p:nvSpPr>
           <p:spPr>
             <a:xfrm>
-              <a:off x="5251456" y="2231153"/>
+              <a:off x="3056738" y="1120696"/>
               <a:ext cx="4965954" cy="0"/>
             </a:xfrm>
             <a:custGeom>
@@ -3441,7 +3441,7 @@
           </p:nvSpPr>
           <p:spPr>
             <a:xfrm>
-              <a:off x="5499758" y="3277117"/>
+              <a:off x="3305039" y="1961745"/>
               <a:ext cx="49651" cy="49651"/>
             </a:xfrm>
             <a:prstGeom prst="ellipse">
@@ -3476,7 +3476,7 @@
           </p:nvSpPr>
           <p:spPr>
             <a:xfrm>
-              <a:off x="5450098" y="3048558"/>
+              <a:off x="3255380" y="1776925"/>
               <a:ext cx="49651" cy="49651"/>
             </a:xfrm>
             <a:prstGeom prst="ellipse">
@@ -3511,7 +3511,7 @@
           </p:nvSpPr>
           <p:spPr>
             <a:xfrm>
-              <a:off x="5996353" y="3021427"/>
+              <a:off x="3801635" y="1754987"/>
               <a:ext cx="49651" cy="49651"/>
             </a:xfrm>
             <a:prstGeom prst="ellipse">
@@ -3546,7 +3546,7 @@
           </p:nvSpPr>
           <p:spPr>
             <a:xfrm>
-              <a:off x="5946694" y="2851035"/>
+              <a:off x="3751975" y="1617202"/>
               <a:ext cx="49651" cy="49651"/>
             </a:xfrm>
             <a:prstGeom prst="ellipse">
@@ -3581,7 +3581,7 @@
           </p:nvSpPr>
           <p:spPr>
             <a:xfrm>
-              <a:off x="6492949" y="2792358"/>
+              <a:off x="4298230" y="1569754"/>
               <a:ext cx="49651" cy="49651"/>
             </a:xfrm>
             <a:prstGeom prst="ellipse">
@@ -3616,7 +3616,7 @@
           </p:nvSpPr>
           <p:spPr>
             <a:xfrm>
-              <a:off x="6443289" y="2603432"/>
+              <a:off x="4248571" y="1416982"/>
               <a:ext cx="49651" cy="49651"/>
             </a:xfrm>
             <a:prstGeom prst="ellipse">
@@ -3651,7 +3651,7 @@
           </p:nvSpPr>
           <p:spPr>
             <a:xfrm>
-              <a:off x="6989544" y="2777808"/>
+              <a:off x="4794826" y="1557988"/>
               <a:ext cx="49651" cy="49651"/>
             </a:xfrm>
             <a:prstGeom prst="ellipse">
@@ -3686,7 +3686,7 @@
           </p:nvSpPr>
           <p:spPr>
             <a:xfrm>
-              <a:off x="6939884" y="2544418"/>
+              <a:off x="4745166" y="1369261"/>
               <a:ext cx="49651" cy="49651"/>
             </a:xfrm>
             <a:prstGeom prst="ellipse">
@@ -3721,7 +3721,7 @@
           </p:nvSpPr>
           <p:spPr>
             <a:xfrm>
-              <a:off x="7486139" y="2740359"/>
+              <a:off x="5291421" y="1527705"/>
               <a:ext cx="49651" cy="49651"/>
             </a:xfrm>
             <a:prstGeom prst="ellipse">
@@ -3756,7 +3756,7 @@
           </p:nvSpPr>
           <p:spPr>
             <a:xfrm>
-              <a:off x="7436480" y="2497099"/>
+              <a:off x="5241761" y="1330998"/>
               <a:ext cx="49651" cy="49651"/>
             </a:xfrm>
             <a:prstGeom prst="ellipse">
@@ -3791,7 +3791,7 @@
           </p:nvSpPr>
           <p:spPr>
             <a:xfrm>
-              <a:off x="7982735" y="2738131"/>
+              <a:off x="5788016" y="1525904"/>
               <a:ext cx="49651" cy="49651"/>
             </a:xfrm>
             <a:prstGeom prst="ellipse">
@@ -3826,7 +3826,7 @@
           </p:nvSpPr>
           <p:spPr>
             <a:xfrm>
-              <a:off x="7933075" y="2505228"/>
+              <a:off x="5738357" y="1337571"/>
               <a:ext cx="49651" cy="49651"/>
             </a:xfrm>
             <a:prstGeom prst="ellipse">
@@ -3861,7 +3861,7 @@
           </p:nvSpPr>
           <p:spPr>
             <a:xfrm>
-              <a:off x="8479330" y="2704393"/>
+              <a:off x="6284612" y="1498623"/>
               <a:ext cx="49651" cy="49651"/>
             </a:xfrm>
             <a:prstGeom prst="ellipse">
@@ -3896,7 +3896,7 @@
           </p:nvSpPr>
           <p:spPr>
             <a:xfrm>
-              <a:off x="8429671" y="2510513"/>
+              <a:off x="6234952" y="1341845"/>
               <a:ext cx="49651" cy="49651"/>
             </a:xfrm>
             <a:prstGeom prst="ellipse">
@@ -3931,7 +3931,7 @@
           </p:nvSpPr>
           <p:spPr>
             <a:xfrm>
-              <a:off x="8975926" y="2564952"/>
+              <a:off x="6781207" y="1385866"/>
               <a:ext cx="49651" cy="49651"/>
             </a:xfrm>
             <a:prstGeom prst="ellipse">
@@ -3966,7 +3966,7 @@
           </p:nvSpPr>
           <p:spPr>
             <a:xfrm>
-              <a:off x="8926266" y="2356079"/>
+              <a:off x="6731548" y="1216964"/>
               <a:ext cx="49651" cy="49651"/>
             </a:xfrm>
             <a:prstGeom prst="ellipse">
@@ -4001,7 +4001,7 @@
           </p:nvSpPr>
           <p:spPr>
             <a:xfrm>
-              <a:off x="9472521" y="2659107"/>
+              <a:off x="7277803" y="1462003"/>
               <a:ext cx="49651" cy="49651"/>
             </a:xfrm>
             <a:prstGeom prst="ellipse">
@@ -4036,7 +4036,7 @@
           </p:nvSpPr>
           <p:spPr>
             <a:xfrm>
-              <a:off x="9422862" y="2560283"/>
+              <a:off x="7228143" y="1382091"/>
               <a:ext cx="49651" cy="49651"/>
             </a:xfrm>
             <a:prstGeom prst="ellipse">
@@ -4071,7 +4071,7 @@
           </p:nvSpPr>
           <p:spPr>
             <a:xfrm>
-              <a:off x="9969117" y="2808406"/>
+              <a:off x="7774398" y="1582731"/>
               <a:ext cx="49651" cy="49651"/>
             </a:xfrm>
             <a:prstGeom prst="ellipse">
@@ -4106,7 +4106,7 @@
           </p:nvSpPr>
           <p:spPr>
             <a:xfrm>
-              <a:off x="9919457" y="2608516"/>
+              <a:off x="7724739" y="1421093"/>
               <a:ext cx="49651" cy="49651"/>
             </a:xfrm>
             <a:prstGeom prst="ellipse">
@@ -4141,15 +4141,15 @@
           </p:nvSpPr>
           <p:spPr>
             <a:xfrm>
-              <a:off x="5524584" y="3216506"/>
-              <a:ext cx="0" cy="170874"/>
+              <a:off x="3329865" y="1917484"/>
+              <a:ext cx="0" cy="138174"/>
             </a:xfrm>
             <a:custGeom>
               <a:avLst/>
               <a:pathLst>
-                <a:path w="0" h="170874">
+                <a:path w="0" h="138174">
                   <a:moveTo>
-                    <a:pt x="0" y="170874"/>
+                    <a:pt x="0" y="138174"/>
                   </a:moveTo>
                   <a:lnTo>
                     <a:pt x="0" y="0"/>
@@ -4181,15 +4181,15 @@
           </p:nvSpPr>
           <p:spPr>
             <a:xfrm>
-              <a:off x="5474924" y="2989948"/>
-              <a:ext cx="0" cy="166870"/>
+              <a:off x="3280206" y="1734282"/>
+              <a:ext cx="0" cy="134936"/>
             </a:xfrm>
             <a:custGeom>
               <a:avLst/>
               <a:pathLst>
-                <a:path w="0" h="166870">
+                <a:path w="0" h="134936">
                   <a:moveTo>
-                    <a:pt x="0" y="166870"/>
+                    <a:pt x="0" y="134936"/>
                   </a:moveTo>
                   <a:lnTo>
                     <a:pt x="0" y="0"/>
@@ -4221,15 +4221,15 @@
           </p:nvSpPr>
           <p:spPr>
             <a:xfrm>
-              <a:off x="6021179" y="2979725"/>
-              <a:ext cx="0" cy="133056"/>
+              <a:off x="3826461" y="1726016"/>
+              <a:ext cx="0" cy="107594"/>
             </a:xfrm>
             <a:custGeom>
               <a:avLst/>
               <a:pathLst>
-                <a:path w="0" h="133056">
+                <a:path w="0" h="107594">
                   <a:moveTo>
-                    <a:pt x="0" y="133056"/>
+                    <a:pt x="0" y="107594"/>
                   </a:moveTo>
                   <a:lnTo>
                     <a:pt x="0" y="0"/>
@@ -4261,15 +4261,15 @@
           </p:nvSpPr>
           <p:spPr>
             <a:xfrm>
-              <a:off x="5971520" y="2810165"/>
-              <a:ext cx="0" cy="131391"/>
+              <a:off x="3776801" y="1588904"/>
+              <a:ext cx="0" cy="106247"/>
             </a:xfrm>
             <a:custGeom>
               <a:avLst/>
               <a:pathLst>
-                <a:path w="0" h="131391">
+                <a:path w="0" h="106247">
                   <a:moveTo>
-                    <a:pt x="0" y="131391"/>
+                    <a:pt x="0" y="106247"/>
                   </a:moveTo>
                   <a:lnTo>
                     <a:pt x="0" y="0"/>
@@ -4301,15 +4301,15 @@
           </p:nvSpPr>
           <p:spPr>
             <a:xfrm>
-              <a:off x="6517775" y="2747886"/>
-              <a:ext cx="0" cy="138594"/>
+              <a:off x="4323056" y="1538544"/>
+              <a:ext cx="0" cy="112071"/>
             </a:xfrm>
             <a:custGeom>
               <a:avLst/>
               <a:pathLst>
-                <a:path w="0" h="138594">
+                <a:path w="0" h="112071">
                   <a:moveTo>
-                    <a:pt x="0" y="138594"/>
+                    <a:pt x="0" y="112071"/>
                   </a:moveTo>
                   <a:lnTo>
                     <a:pt x="0" y="0"/>
@@ -4341,15 +4341,15 @@
           </p:nvSpPr>
           <p:spPr>
             <a:xfrm>
-              <a:off x="6468115" y="2558412"/>
-              <a:ext cx="0" cy="139690"/>
+              <a:off x="4273397" y="1385329"/>
+              <a:ext cx="0" cy="112958"/>
             </a:xfrm>
             <a:custGeom>
               <a:avLst/>
               <a:pathLst>
-                <a:path w="0" h="139690">
+                <a:path w="0" h="112958">
                   <a:moveTo>
-                    <a:pt x="0" y="139690"/>
+                    <a:pt x="0" y="112958"/>
                   </a:moveTo>
                   <a:lnTo>
                     <a:pt x="0" y="0"/>
@@ -4381,15 +4381,15 @@
           </p:nvSpPr>
           <p:spPr>
             <a:xfrm>
-              <a:off x="7014370" y="2735587"/>
-              <a:ext cx="0" cy="134095"/>
+              <a:off x="4819651" y="1528597"/>
+              <a:ext cx="0" cy="108433"/>
             </a:xfrm>
             <a:custGeom>
               <a:avLst/>
               <a:pathLst>
-                <a:path w="0" h="134095">
+                <a:path w="0" h="108433">
                   <a:moveTo>
-                    <a:pt x="0" y="134095"/>
+                    <a:pt x="0" y="108433"/>
                   </a:moveTo>
                   <a:lnTo>
                     <a:pt x="0" y="0"/>
@@ -4421,15 +4421,15 @@
           </p:nvSpPr>
           <p:spPr>
             <a:xfrm>
-              <a:off x="6964710" y="2503320"/>
-              <a:ext cx="0" cy="131848"/>
+              <a:off x="4769992" y="1340779"/>
+              <a:ext cx="0" cy="106616"/>
             </a:xfrm>
             <a:custGeom>
               <a:avLst/>
               <a:pathLst>
-                <a:path w="0" h="131848">
+                <a:path w="0" h="106616">
                   <a:moveTo>
-                    <a:pt x="0" y="131848"/>
+                    <a:pt x="0" y="106616"/>
                   </a:moveTo>
                   <a:lnTo>
                     <a:pt x="0" y="0"/>
@@ -4461,15 +4461,15 @@
           </p:nvSpPr>
           <p:spPr>
             <a:xfrm>
-              <a:off x="7510965" y="2701370"/>
-              <a:ext cx="0" cy="127628"/>
+              <a:off x="5316247" y="1500929"/>
+              <a:ext cx="0" cy="103204"/>
             </a:xfrm>
             <a:custGeom>
               <a:avLst/>
               <a:pathLst>
-                <a:path w="0" h="127628">
+                <a:path w="0" h="103204">
                   <a:moveTo>
-                    <a:pt x="0" y="127628"/>
+                    <a:pt x="0" y="103204"/>
                   </a:moveTo>
                   <a:lnTo>
                     <a:pt x="0" y="0"/>
@@ -4501,15 +4501,15 @@
           </p:nvSpPr>
           <p:spPr>
             <a:xfrm>
-              <a:off x="7461306" y="2459503"/>
-              <a:ext cx="0" cy="124842"/>
+              <a:off x="5266587" y="1305348"/>
+              <a:ext cx="0" cy="100951"/>
             </a:xfrm>
             <a:custGeom>
               <a:avLst/>
               <a:pathLst>
-                <a:path w="0" h="124842">
+                <a:path w="0" h="100951">
                   <a:moveTo>
-                    <a:pt x="0" y="124842"/>
+                    <a:pt x="0" y="100951"/>
                   </a:moveTo>
                   <a:lnTo>
                     <a:pt x="0" y="0"/>
@@ -4541,15 +4541,15 @@
           </p:nvSpPr>
           <p:spPr>
             <a:xfrm>
-              <a:off x="8007561" y="2693619"/>
-              <a:ext cx="0" cy="138676"/>
+              <a:off x="5812842" y="1494661"/>
+              <a:ext cx="0" cy="112138"/>
             </a:xfrm>
             <a:custGeom>
               <a:avLst/>
               <a:pathLst>
-                <a:path w="0" h="138676">
+                <a:path w="0" h="112138">
                   <a:moveTo>
-                    <a:pt x="0" y="138676"/>
+                    <a:pt x="0" y="112138"/>
                   </a:moveTo>
                   <a:lnTo>
                     <a:pt x="0" y="0"/>
@@ -4581,15 +4581,15 @@
           </p:nvSpPr>
           <p:spPr>
             <a:xfrm>
-              <a:off x="7957901" y="2460802"/>
-              <a:ext cx="0" cy="138502"/>
+              <a:off x="5763183" y="1306398"/>
+              <a:ext cx="0" cy="111997"/>
             </a:xfrm>
             <a:custGeom>
               <a:avLst/>
               <a:pathLst>
-                <a:path w="0" h="138502">
+                <a:path w="0" h="111997">
                   <a:moveTo>
-                    <a:pt x="0" y="138502"/>
+                    <a:pt x="0" y="111997"/>
                   </a:moveTo>
                   <a:lnTo>
                     <a:pt x="0" y="0"/>
@@ -4621,15 +4621,15 @@
           </p:nvSpPr>
           <p:spPr>
             <a:xfrm>
-              <a:off x="8504156" y="2630419"/>
-              <a:ext cx="0" cy="197600"/>
+              <a:off x="6309438" y="1443556"/>
+              <a:ext cx="0" cy="159785"/>
             </a:xfrm>
             <a:custGeom>
               <a:avLst/>
               <a:pathLst>
-                <a:path w="0" h="197600">
+                <a:path w="0" h="159785">
                   <a:moveTo>
-                    <a:pt x="0" y="197600"/>
+                    <a:pt x="0" y="159785"/>
                   </a:moveTo>
                   <a:lnTo>
                     <a:pt x="0" y="0"/>
@@ -4661,15 +4661,15 @@
           </p:nvSpPr>
           <p:spPr>
             <a:xfrm>
-              <a:off x="8454497" y="2433881"/>
-              <a:ext cx="0" cy="202917"/>
+              <a:off x="6259778" y="1284628"/>
+              <a:ext cx="0" cy="164085"/>
             </a:xfrm>
             <a:custGeom>
               <a:avLst/>
               <a:pathLst>
-                <a:path w="0" h="202917">
+                <a:path w="0" h="164085">
                   <a:moveTo>
-                    <a:pt x="0" y="202917"/>
+                    <a:pt x="0" y="164085"/>
                   </a:moveTo>
                   <a:lnTo>
                     <a:pt x="0" y="0"/>
@@ -4701,15 +4701,15 @@
           </p:nvSpPr>
           <p:spPr>
             <a:xfrm>
-              <a:off x="9000752" y="2436848"/>
-              <a:ext cx="0" cy="305860"/>
+              <a:off x="6806033" y="1287028"/>
+              <a:ext cx="0" cy="247328"/>
             </a:xfrm>
             <a:custGeom>
               <a:avLst/>
               <a:pathLst>
-                <a:path w="0" h="305860">
+                <a:path w="0" h="247328">
                   <a:moveTo>
-                    <a:pt x="0" y="305860"/>
+                    <a:pt x="0" y="247328"/>
                   </a:moveTo>
                   <a:lnTo>
                     <a:pt x="0" y="0"/>
@@ -4741,15 +4741,15 @@
           </p:nvSpPr>
           <p:spPr>
             <a:xfrm>
-              <a:off x="8951092" y="2231153"/>
-              <a:ext cx="0" cy="303875"/>
+              <a:off x="6756374" y="1120696"/>
+              <a:ext cx="0" cy="245723"/>
             </a:xfrm>
             <a:custGeom>
               <a:avLst/>
               <a:pathLst>
-                <a:path w="0" h="303875">
+                <a:path w="0" h="245723">
                   <a:moveTo>
-                    <a:pt x="0" y="303875"/>
+                    <a:pt x="0" y="245723"/>
                   </a:moveTo>
                   <a:lnTo>
                     <a:pt x="0" y="0"/>
@@ -4781,15 +4781,15 @@
           </p:nvSpPr>
           <p:spPr>
             <a:xfrm>
-              <a:off x="9497347" y="2434967"/>
-              <a:ext cx="0" cy="497932"/>
+              <a:off x="7302629" y="1285507"/>
+              <a:ext cx="0" cy="402644"/>
             </a:xfrm>
             <a:custGeom>
               <a:avLst/>
               <a:pathLst>
-                <a:path w="0" h="497932">
+                <a:path w="0" h="402644">
                   <a:moveTo>
-                    <a:pt x="0" y="497932"/>
+                    <a:pt x="0" y="402644"/>
                   </a:moveTo>
                   <a:lnTo>
                     <a:pt x="0" y="0"/>
@@ -4821,15 +4821,15 @@
           </p:nvSpPr>
           <p:spPr>
             <a:xfrm>
-              <a:off x="9447688" y="2331027"/>
-              <a:ext cx="0" cy="508163"/>
+              <a:off x="7252969" y="1201458"/>
+              <a:ext cx="0" cy="410917"/>
             </a:xfrm>
             <a:custGeom>
               <a:avLst/>
               <a:pathLst>
-                <a:path w="0" h="508163">
+                <a:path w="0" h="410917">
                   <a:moveTo>
-                    <a:pt x="0" y="508163"/>
+                    <a:pt x="0" y="410917"/>
                   </a:moveTo>
                   <a:lnTo>
                     <a:pt x="0" y="0"/>
@@ -4861,15 +4861,15 @@
           </p:nvSpPr>
           <p:spPr>
             <a:xfrm>
-              <a:off x="9993943" y="2788107"/>
-              <a:ext cx="0" cy="90250"/>
+              <a:off x="7799224" y="1571067"/>
+              <a:ext cx="0" cy="72979"/>
             </a:xfrm>
             <a:custGeom>
               <a:avLst/>
               <a:pathLst>
-                <a:path w="0" h="90250">
+                <a:path w="0" h="72979">
                   <a:moveTo>
-                    <a:pt x="0" y="90250"/>
+                    <a:pt x="0" y="72979"/>
                   </a:moveTo>
                   <a:lnTo>
                     <a:pt x="0" y="0"/>
@@ -4901,15 +4901,15 @@
           </p:nvSpPr>
           <p:spPr>
             <a:xfrm>
-              <a:off x="9944283" y="2587362"/>
-              <a:ext cx="0" cy="91960"/>
+              <a:off x="7749564" y="1408738"/>
+              <a:ext cx="0" cy="74362"/>
             </a:xfrm>
             <a:custGeom>
               <a:avLst/>
               <a:pathLst>
-                <a:path w="0" h="91960">
+                <a:path w="0" h="74362">
                   <a:moveTo>
-                    <a:pt x="0" y="91960"/>
+                    <a:pt x="0" y="74362"/>
                   </a:moveTo>
                   <a:lnTo>
                     <a:pt x="0" y="0"/>
@@ -4941,39 +4941,39 @@
           </p:nvSpPr>
           <p:spPr>
             <a:xfrm>
-              <a:off x="5474924" y="2380904"/>
-              <a:ext cx="3972763" cy="692479"/>
+              <a:off x="3280206" y="1241790"/>
+              <a:ext cx="3972763" cy="559960"/>
             </a:xfrm>
             <a:custGeom>
               <a:avLst/>
               <a:pathLst>
-                <a:path w="3972763" h="692479">
+                <a:path w="3972763" h="559960">
                   <a:moveTo>
-                    <a:pt x="0" y="692479"/>
+                    <a:pt x="0" y="559960"/>
                   </a:moveTo>
                   <a:lnTo>
-                    <a:pt x="496595" y="494956"/>
-                  </a:lnTo>
-                  <a:lnTo>
-                    <a:pt x="993190" y="247353"/>
-                  </a:lnTo>
-                  <a:lnTo>
-                    <a:pt x="1489786" y="188339"/>
-                  </a:lnTo>
-                  <a:lnTo>
-                    <a:pt x="1986381" y="141020"/>
-                  </a:lnTo>
-                  <a:lnTo>
-                    <a:pt x="2482977" y="149149"/>
-                  </a:lnTo>
-                  <a:lnTo>
-                    <a:pt x="2979572" y="154434"/>
+                    <a:pt x="496595" y="400237"/>
+                  </a:lnTo>
+                  <a:lnTo>
+                    <a:pt x="993190" y="200017"/>
+                  </a:lnTo>
+                  <a:lnTo>
+                    <a:pt x="1489786" y="152297"/>
+                  </a:lnTo>
+                  <a:lnTo>
+                    <a:pt x="1986381" y="114033"/>
+                  </a:lnTo>
+                  <a:lnTo>
+                    <a:pt x="2482977" y="120606"/>
+                  </a:lnTo>
+                  <a:lnTo>
+                    <a:pt x="2979572" y="124880"/>
                   </a:lnTo>
                   <a:lnTo>
                     <a:pt x="3476167" y="0"/>
                   </a:lnTo>
                   <a:lnTo>
-                    <a:pt x="3972763" y="204204"/>
+                    <a:pt x="3972763" y="165126"/>
                   </a:lnTo>
                 </a:path>
               </a:pathLst>
@@ -5002,39 +5002,39 @@
           </p:nvSpPr>
           <p:spPr>
             <a:xfrm>
-              <a:off x="5524584" y="2589778"/>
-              <a:ext cx="3972763" cy="712164"/>
+              <a:off x="3329865" y="1410692"/>
+              <a:ext cx="3972763" cy="575879"/>
             </a:xfrm>
             <a:custGeom>
               <a:avLst/>
               <a:pathLst>
-                <a:path w="3972763" h="712164">
+                <a:path w="3972763" h="575879">
                   <a:moveTo>
-                    <a:pt x="0" y="712164"/>
+                    <a:pt x="0" y="575879"/>
                   </a:moveTo>
                   <a:lnTo>
-                    <a:pt x="496595" y="456475"/>
-                  </a:lnTo>
-                  <a:lnTo>
-                    <a:pt x="993190" y="227405"/>
-                  </a:lnTo>
-                  <a:lnTo>
-                    <a:pt x="1489786" y="212856"/>
-                  </a:lnTo>
-                  <a:lnTo>
-                    <a:pt x="1986381" y="175406"/>
-                  </a:lnTo>
-                  <a:lnTo>
-                    <a:pt x="2482977" y="173179"/>
-                  </a:lnTo>
-                  <a:lnTo>
-                    <a:pt x="2979572" y="139440"/>
+                    <a:pt x="496595" y="369120"/>
+                  </a:lnTo>
+                  <a:lnTo>
+                    <a:pt x="993190" y="183887"/>
+                  </a:lnTo>
+                  <a:lnTo>
+                    <a:pt x="1489786" y="172122"/>
+                  </a:lnTo>
+                  <a:lnTo>
+                    <a:pt x="1986381" y="141839"/>
+                  </a:lnTo>
+                  <a:lnTo>
+                    <a:pt x="2482977" y="140038"/>
+                  </a:lnTo>
+                  <a:lnTo>
+                    <a:pt x="2979572" y="112756"/>
                   </a:lnTo>
                   <a:lnTo>
                     <a:pt x="3476167" y="0"/>
                   </a:lnTo>
                   <a:lnTo>
-                    <a:pt x="3972763" y="94155"/>
+                    <a:pt x="3972763" y="76136"/>
                   </a:lnTo>
                 </a:path>
               </a:pathLst>
@@ -5063,7 +5063,7 @@
           </p:nvSpPr>
           <p:spPr>
             <a:xfrm>
-              <a:off x="5251456" y="4920322"/>
+              <a:off x="3056738" y="3352666"/>
               <a:ext cx="4965954" cy="0"/>
             </a:xfrm>
             <a:custGeom>
@@ -5106,7 +5106,7 @@
           </p:nvSpPr>
           <p:spPr>
             <a:xfrm>
-              <a:off x="5251456" y="4494700"/>
+              <a:off x="3056738" y="3008494"/>
               <a:ext cx="4965954" cy="0"/>
             </a:xfrm>
             <a:custGeom>
@@ -5149,7 +5149,7 @@
           </p:nvSpPr>
           <p:spPr>
             <a:xfrm>
-              <a:off x="5251456" y="4231185"/>
+              <a:off x="3056738" y="2795407"/>
               <a:ext cx="4965954" cy="0"/>
             </a:xfrm>
             <a:custGeom>
@@ -5192,7 +5192,7 @@
           </p:nvSpPr>
           <p:spPr>
             <a:xfrm>
-              <a:off x="5251456" y="4032785"/>
+              <a:off x="3056738" y="2634975"/>
               <a:ext cx="4965954" cy="0"/>
             </a:xfrm>
             <a:custGeom>
@@ -5235,7 +5235,7 @@
           </p:nvSpPr>
           <p:spPr>
             <a:xfrm>
-              <a:off x="5251456" y="3868918"/>
+              <a:off x="3056738" y="2502467"/>
               <a:ext cx="4965954" cy="0"/>
             </a:xfrm>
             <a:custGeom>
@@ -5278,7 +5278,7 @@
           </p:nvSpPr>
           <p:spPr>
             <a:xfrm>
-              <a:off x="5251456" y="3725766"/>
+              <a:off x="3056738" y="2386710"/>
               <a:ext cx="4965954" cy="0"/>
             </a:xfrm>
             <a:custGeom>
@@ -5321,7 +5321,7 @@
           </p:nvSpPr>
           <p:spPr>
             <a:xfrm>
-              <a:off x="5499758" y="4763085"/>
+              <a:off x="3305039" y="3220768"/>
               <a:ext cx="49651" cy="49651"/>
             </a:xfrm>
             <a:prstGeom prst="ellipse">
@@ -5356,7 +5356,7 @@
           </p:nvSpPr>
           <p:spPr>
             <a:xfrm>
-              <a:off x="5450098" y="4542101"/>
+              <a:off x="3255380" y="3042073"/>
               <a:ext cx="49651" cy="49651"/>
             </a:xfrm>
             <a:prstGeom prst="ellipse">
@@ -5391,7 +5391,7 @@
           </p:nvSpPr>
           <p:spPr>
             <a:xfrm>
-              <a:off x="5996353" y="4508789"/>
+              <a:off x="3801635" y="3015136"/>
               <a:ext cx="49651" cy="49651"/>
             </a:xfrm>
             <a:prstGeom prst="ellipse">
@@ -5426,7 +5426,7 @@
           </p:nvSpPr>
           <p:spPr>
             <a:xfrm>
-              <a:off x="5946694" y="4345973"/>
+              <a:off x="3751975" y="2883478"/>
               <a:ext cx="49651" cy="49651"/>
             </a:xfrm>
             <a:prstGeom prst="ellipse">
@@ -5461,7 +5461,7 @@
           </p:nvSpPr>
           <p:spPr>
             <a:xfrm>
-              <a:off x="6492949" y="4277137"/>
+              <a:off x="4298230" y="2827815"/>
               <a:ext cx="49651" cy="49651"/>
             </a:xfrm>
             <a:prstGeom prst="ellipse">
@@ -5496,7 +5496,7 @@
           </p:nvSpPr>
           <p:spPr>
             <a:xfrm>
-              <a:off x="6443289" y="4095788"/>
+              <a:off x="4248571" y="2681170"/>
               <a:ext cx="49651" cy="49651"/>
             </a:xfrm>
             <a:prstGeom prst="ellipse">
@@ -5531,7 +5531,7 @@
           </p:nvSpPr>
           <p:spPr>
             <a:xfrm>
-              <a:off x="6989544" y="4240615"/>
+              <a:off x="4794826" y="2798282"/>
               <a:ext cx="49651" cy="49651"/>
             </a:xfrm>
             <a:prstGeom prst="ellipse">
@@ -5566,7 +5566,7 @@
           </p:nvSpPr>
           <p:spPr>
             <a:xfrm>
-              <a:off x="6939884" y="4014800"/>
+              <a:off x="4745166" y="2615681"/>
               <a:ext cx="49651" cy="49651"/>
             </a:xfrm>
             <a:prstGeom prst="ellipse">
@@ -5601,7 +5601,7 @@
           </p:nvSpPr>
           <p:spPr>
             <a:xfrm>
-              <a:off x="7486139" y="4244578"/>
+              <a:off x="5291421" y="2801487"/>
               <a:ext cx="49651" cy="49651"/>
             </a:xfrm>
             <a:prstGeom prst="ellipse">
@@ -5636,7 +5636,7 @@
           </p:nvSpPr>
           <p:spPr>
             <a:xfrm>
-              <a:off x="7436480" y="4008894"/>
+              <a:off x="5241761" y="2610905"/>
               <a:ext cx="49651" cy="49651"/>
             </a:xfrm>
             <a:prstGeom prst="ellipse">
@@ -5671,7 +5671,7 @@
           </p:nvSpPr>
           <p:spPr>
             <a:xfrm>
-              <a:off x="7982735" y="4222137"/>
+              <a:off x="5788016" y="2783340"/>
               <a:ext cx="49651" cy="49651"/>
             </a:xfrm>
             <a:prstGeom prst="ellipse">
@@ -5706,7 +5706,7 @@
           </p:nvSpPr>
           <p:spPr>
             <a:xfrm>
-              <a:off x="7933075" y="3996809"/>
+              <a:off x="5738357" y="2601133"/>
               <a:ext cx="49651" cy="49651"/>
             </a:xfrm>
             <a:prstGeom prst="ellipse">
@@ -5741,7 +5741,7 @@
           </p:nvSpPr>
           <p:spPr>
             <a:xfrm>
-              <a:off x="8479330" y="4166744"/>
+              <a:off x="6284612" y="2738548"/>
               <a:ext cx="49651" cy="49651"/>
             </a:xfrm>
             <a:prstGeom prst="ellipse">
@@ -5776,7 +5776,7 @@
           </p:nvSpPr>
           <p:spPr>
             <a:xfrm>
-              <a:off x="8429671" y="3980440"/>
+              <a:off x="6234952" y="2587896"/>
               <a:ext cx="49651" cy="49651"/>
             </a:xfrm>
             <a:prstGeom prst="ellipse">
@@ -5811,7 +5811,7 @@
           </p:nvSpPr>
           <p:spPr>
             <a:xfrm>
-              <a:off x="8975926" y="4153297"/>
+              <a:off x="6781207" y="2727674"/>
               <a:ext cx="49651" cy="49651"/>
             </a:xfrm>
             <a:prstGeom prst="ellipse">
@@ -5846,7 +5846,7 @@
           </p:nvSpPr>
           <p:spPr>
             <a:xfrm>
-              <a:off x="8926266" y="3951999"/>
+              <a:off x="6731548" y="2564898"/>
               <a:ext cx="49651" cy="49651"/>
             </a:xfrm>
             <a:prstGeom prst="ellipse">
@@ -5881,7 +5881,7 @@
           </p:nvSpPr>
           <p:spPr>
             <a:xfrm>
-              <a:off x="9472521" y="4115391"/>
+              <a:off x="7277803" y="2697022"/>
               <a:ext cx="49651" cy="49651"/>
             </a:xfrm>
             <a:prstGeom prst="ellipse">
@@ -5916,7 +5916,7 @@
           </p:nvSpPr>
           <p:spPr>
             <a:xfrm>
-              <a:off x="9422862" y="4024143"/>
+              <a:off x="7228143" y="2623235"/>
               <a:ext cx="49651" cy="49651"/>
             </a:xfrm>
             <a:prstGeom prst="ellipse">
@@ -5951,7 +5951,7 @@
           </p:nvSpPr>
           <p:spPr>
             <a:xfrm>
-              <a:off x="9969117" y="4299086"/>
+              <a:off x="7774398" y="2845563"/>
               <a:ext cx="49651" cy="49651"/>
             </a:xfrm>
             <a:prstGeom prst="ellipse">
@@ -5986,7 +5986,7 @@
           </p:nvSpPr>
           <p:spPr>
             <a:xfrm>
-              <a:off x="9919457" y="4106772"/>
+              <a:off x="7724739" y="2690052"/>
               <a:ext cx="49651" cy="49651"/>
             </a:xfrm>
             <a:prstGeom prst="ellipse">
@@ -6021,15 +6021,15 @@
           </p:nvSpPr>
           <p:spPr>
             <a:xfrm>
-              <a:off x="5524584" y="4764600"/>
-              <a:ext cx="0" cy="46621"/>
+              <a:off x="3329865" y="3226744"/>
+              <a:ext cx="0" cy="37699"/>
             </a:xfrm>
             <a:custGeom>
               <a:avLst/>
               <a:pathLst>
-                <a:path w="0" h="46621">
+                <a:path w="0" h="37699">
                   <a:moveTo>
-                    <a:pt x="0" y="46621"/>
+                    <a:pt x="0" y="37699"/>
                   </a:moveTo>
                   <a:lnTo>
                     <a:pt x="0" y="0"/>
@@ -6061,15 +6061,15 @@
           </p:nvSpPr>
           <p:spPr>
             <a:xfrm>
-              <a:off x="5474924" y="4546841"/>
-              <a:ext cx="0" cy="40171"/>
+              <a:off x="3280206" y="3050657"/>
+              <a:ext cx="0" cy="32484"/>
             </a:xfrm>
             <a:custGeom>
               <a:avLst/>
               <a:pathLst>
-                <a:path w="0" h="40171">
+                <a:path w="0" h="32484">
                   <a:moveTo>
-                    <a:pt x="0" y="40171"/>
+                    <a:pt x="0" y="32484"/>
                   </a:moveTo>
                   <a:lnTo>
                     <a:pt x="0" y="0"/>
@@ -6101,15 +6101,15 @@
           </p:nvSpPr>
           <p:spPr>
             <a:xfrm>
-              <a:off x="6021179" y="4516367"/>
-              <a:ext cx="0" cy="34496"/>
+              <a:off x="3826461" y="3026015"/>
+              <a:ext cx="0" cy="27894"/>
             </a:xfrm>
             <a:custGeom>
               <a:avLst/>
               <a:pathLst>
-                <a:path w="0" h="34496">
+                <a:path w="0" h="27894">
                   <a:moveTo>
-                    <a:pt x="0" y="34496"/>
+                    <a:pt x="0" y="27894"/>
                   </a:moveTo>
                   <a:lnTo>
                     <a:pt x="0" y="0"/>
@@ -6141,15 +6141,15 @@
           </p:nvSpPr>
           <p:spPr>
             <a:xfrm>
-              <a:off x="5971520" y="4355416"/>
-              <a:ext cx="0" cy="30765"/>
+              <a:off x="3776801" y="2895865"/>
+              <a:ext cx="0" cy="24878"/>
             </a:xfrm>
             <a:custGeom>
               <a:avLst/>
               <a:pathLst>
-                <a:path w="0" h="30765">
+                <a:path w="0" h="24878">
                   <a:moveTo>
-                    <a:pt x="0" y="30765"/>
+                    <a:pt x="0" y="24878"/>
                   </a:moveTo>
                   <a:lnTo>
                     <a:pt x="0" y="0"/>
@@ -6181,15 +6181,15 @@
           </p:nvSpPr>
           <p:spPr>
             <a:xfrm>
-              <a:off x="6517775" y="4283204"/>
-              <a:ext cx="0" cy="37518"/>
+              <a:off x="4323056" y="2837472"/>
+              <a:ext cx="0" cy="30338"/>
             </a:xfrm>
             <a:custGeom>
               <a:avLst/>
               <a:pathLst>
-                <a:path w="0" h="37518">
+                <a:path w="0" h="30338">
                   <a:moveTo>
-                    <a:pt x="0" y="37518"/>
+                    <a:pt x="0" y="30338"/>
                   </a:moveTo>
                   <a:lnTo>
                     <a:pt x="0" y="0"/>
@@ -6221,15 +6221,15 @@
           </p:nvSpPr>
           <p:spPr>
             <a:xfrm>
-              <a:off x="6468115" y="4103798"/>
-              <a:ext cx="0" cy="33631"/>
+              <a:off x="4273397" y="2692398"/>
+              <a:ext cx="0" cy="27195"/>
             </a:xfrm>
             <a:custGeom>
               <a:avLst/>
               <a:pathLst>
-                <a:path w="0" h="33631">
+                <a:path w="0" h="27195">
                   <a:moveTo>
-                    <a:pt x="0" y="33631"/>
+                    <a:pt x="0" y="27195"/>
                   </a:moveTo>
                   <a:lnTo>
                     <a:pt x="0" y="0"/>
@@ -6261,15 +6261,15 @@
           </p:nvSpPr>
           <p:spPr>
             <a:xfrm>
-              <a:off x="7014370" y="4247428"/>
-              <a:ext cx="0" cy="36026"/>
+              <a:off x="4819651" y="2808542"/>
+              <a:ext cx="0" cy="29132"/>
             </a:xfrm>
             <a:custGeom>
               <a:avLst/>
               <a:pathLst>
-                <a:path w="0" h="36026">
+                <a:path w="0" h="29132">
                   <a:moveTo>
-                    <a:pt x="0" y="36026"/>
+                    <a:pt x="0" y="29132"/>
                   </a:moveTo>
                   <a:lnTo>
                     <a:pt x="0" y="0"/>
@@ -6301,15 +6301,15 @@
           </p:nvSpPr>
           <p:spPr>
             <a:xfrm>
-              <a:off x="6964710" y="4023749"/>
-              <a:ext cx="0" cy="31754"/>
+              <a:off x="4769992" y="2627668"/>
+              <a:ext cx="0" cy="25677"/>
             </a:xfrm>
             <a:custGeom>
               <a:avLst/>
               <a:pathLst>
-                <a:path w="0" h="31754">
+                <a:path w="0" h="25677">
                   <a:moveTo>
-                    <a:pt x="0" y="31754"/>
+                    <a:pt x="0" y="25677"/>
                   </a:moveTo>
                   <a:lnTo>
                     <a:pt x="0" y="0"/>
@@ -6341,15 +6341,15 @@
           </p:nvSpPr>
           <p:spPr>
             <a:xfrm>
-              <a:off x="7510965" y="4252284"/>
-              <a:ext cx="0" cy="34240"/>
+              <a:off x="5316247" y="2812469"/>
+              <a:ext cx="0" cy="27687"/>
             </a:xfrm>
             <a:custGeom>
               <a:avLst/>
               <a:pathLst>
-                <a:path w="0" h="34240">
+                <a:path w="0" h="27687">
                   <a:moveTo>
-                    <a:pt x="0" y="34240"/>
+                    <a:pt x="0" y="27687"/>
                   </a:moveTo>
                   <a:lnTo>
                     <a:pt x="0" y="0"/>
@@ -6381,15 +6381,15 @@
           </p:nvSpPr>
           <p:spPr>
             <a:xfrm>
-              <a:off x="7461306" y="4019146"/>
-              <a:ext cx="0" cy="29148"/>
+              <a:off x="5266587" y="2623946"/>
+              <a:ext cx="0" cy="23570"/>
             </a:xfrm>
             <a:custGeom>
               <a:avLst/>
               <a:pathLst>
-                <a:path w="0" h="29148">
+                <a:path w="0" h="23570">
                   <a:moveTo>
-                    <a:pt x="0" y="29148"/>
+                    <a:pt x="0" y="23570"/>
                   </a:moveTo>
                   <a:lnTo>
                     <a:pt x="0" y="0"/>
@@ -6421,15 +6421,15 @@
           </p:nvSpPr>
           <p:spPr>
             <a:xfrm>
-              <a:off x="8007561" y="4228136"/>
-              <a:ext cx="0" cy="37654"/>
+              <a:off x="5812842" y="2792942"/>
+              <a:ext cx="0" cy="30449"/>
             </a:xfrm>
             <a:custGeom>
               <a:avLst/>
               <a:pathLst>
-                <a:path w="0" h="37654">
+                <a:path w="0" h="30449">
                   <a:moveTo>
-                    <a:pt x="0" y="37654"/>
+                    <a:pt x="0" y="30449"/>
                   </a:moveTo>
                   <a:lnTo>
                     <a:pt x="0" y="0"/>
@@ -6461,15 +6461,15 @@
           </p:nvSpPr>
           <p:spPr>
             <a:xfrm>
-              <a:off x="7957901" y="4005095"/>
-              <a:ext cx="0" cy="33081"/>
+              <a:off x="5763183" y="2612584"/>
+              <a:ext cx="0" cy="26750"/>
             </a:xfrm>
             <a:custGeom>
               <a:avLst/>
               <a:pathLst>
-                <a:path w="0" h="33081">
+                <a:path w="0" h="26750">
                   <a:moveTo>
-                    <a:pt x="0" y="33081"/>
+                    <a:pt x="0" y="26750"/>
                   </a:moveTo>
                   <a:lnTo>
                     <a:pt x="0" y="0"/>
@@ -6501,15 +6501,15 @@
           </p:nvSpPr>
           <p:spPr>
             <a:xfrm>
-              <a:off x="8504156" y="4164218"/>
-              <a:ext cx="0" cy="54704"/>
+              <a:off x="6309438" y="2741256"/>
+              <a:ext cx="0" cy="44235"/>
             </a:xfrm>
             <a:custGeom>
               <a:avLst/>
               <a:pathLst>
-                <a:path w="0" h="54704">
+                <a:path w="0" h="44235">
                   <a:moveTo>
-                    <a:pt x="0" y="54704"/>
+                    <a:pt x="0" y="44235"/>
                   </a:moveTo>
                   <a:lnTo>
                     <a:pt x="0" y="0"/>
@@ -6541,15 +6541,15 @@
           </p:nvSpPr>
           <p:spPr>
             <a:xfrm>
-              <a:off x="8454497" y="3979551"/>
-              <a:ext cx="0" cy="51430"/>
+              <a:off x="6259778" y="2591928"/>
+              <a:ext cx="0" cy="41588"/>
             </a:xfrm>
             <a:custGeom>
               <a:avLst/>
               <a:pathLst>
-                <a:path w="0" h="51430">
+                <a:path w="0" h="41588">
                   <a:moveTo>
-                    <a:pt x="0" y="51430"/>
+                    <a:pt x="0" y="41588"/>
                   </a:moveTo>
                   <a:lnTo>
                     <a:pt x="0" y="0"/>
@@ -6581,15 +6581,15 @@
           </p:nvSpPr>
           <p:spPr>
             <a:xfrm>
-              <a:off x="9000752" y="4134028"/>
-              <a:ext cx="0" cy="88190"/>
+              <a:off x="6806033" y="2716843"/>
+              <a:ext cx="0" cy="71313"/>
             </a:xfrm>
             <a:custGeom>
               <a:avLst/>
               <a:pathLst>
-                <a:path w="0" h="88190">
+                <a:path w="0" h="71313">
                   <a:moveTo>
-                    <a:pt x="0" y="88190"/>
+                    <a:pt x="0" y="71313"/>
                   </a:moveTo>
                   <a:lnTo>
                     <a:pt x="0" y="0"/>
@@ -6621,15 +6621,15 @@
           </p:nvSpPr>
           <p:spPr>
             <a:xfrm>
-              <a:off x="8951092" y="3934951"/>
-              <a:ext cx="0" cy="83748"/>
+              <a:off x="6756374" y="2555863"/>
+              <a:ext cx="0" cy="67721"/>
             </a:xfrm>
             <a:custGeom>
               <a:avLst/>
               <a:pathLst>
-                <a:path w="0" h="83748">
+                <a:path w="0" h="67721">
                   <a:moveTo>
-                    <a:pt x="0" y="83748"/>
+                    <a:pt x="0" y="67721"/>
                   </a:moveTo>
                   <a:lnTo>
                     <a:pt x="0" y="0"/>
@@ -6661,15 +6661,15 @@
           </p:nvSpPr>
           <p:spPr>
             <a:xfrm>
-              <a:off x="9497347" y="4073569"/>
-              <a:ext cx="0" cy="133296"/>
+              <a:off x="7302629" y="2667954"/>
+              <a:ext cx="0" cy="107787"/>
             </a:xfrm>
             <a:custGeom>
               <a:avLst/>
               <a:pathLst>
-                <a:path w="0" h="133296">
+                <a:path w="0" h="107787">
                   <a:moveTo>
-                    <a:pt x="0" y="133296"/>
+                    <a:pt x="0" y="107787"/>
                   </a:moveTo>
                   <a:lnTo>
                     <a:pt x="0" y="0"/>
@@ -6701,15 +6701,15 @@
           </p:nvSpPr>
           <p:spPr>
             <a:xfrm>
-              <a:off x="9447688" y="3977818"/>
-              <a:ext cx="0" cy="142300"/>
+              <a:off x="7252969" y="2590527"/>
+              <a:ext cx="0" cy="115068"/>
             </a:xfrm>
             <a:custGeom>
               <a:avLst/>
               <a:pathLst>
-                <a:path w="0" h="142300">
+                <a:path w="0" h="115068">
                   <a:moveTo>
-                    <a:pt x="0" y="142300"/>
+                    <a:pt x="0" y="115068"/>
                   </a:moveTo>
                   <a:lnTo>
                     <a:pt x="0" y="0"/>
@@ -6741,15 +6741,15 @@
           </p:nvSpPr>
           <p:spPr>
             <a:xfrm>
-              <a:off x="9993943" y="4313153"/>
-              <a:ext cx="0" cy="21516"/>
+              <a:off x="7799224" y="2861690"/>
+              <a:ext cx="0" cy="17399"/>
             </a:xfrm>
             <a:custGeom>
               <a:avLst/>
               <a:pathLst>
-                <a:path w="0" h="21516">
+                <a:path w="0" h="17399">
                   <a:moveTo>
-                    <a:pt x="0" y="21516"/>
+                    <a:pt x="0" y="17399"/>
                   </a:moveTo>
                   <a:lnTo>
                     <a:pt x="0" y="0"/>
@@ -6781,15 +6781,15 @@
           </p:nvSpPr>
           <p:spPr>
             <a:xfrm>
-              <a:off x="9944283" y="4120946"/>
-              <a:ext cx="0" cy="21303"/>
+              <a:off x="7749564" y="2706265"/>
+              <a:ext cx="0" cy="17226"/>
             </a:xfrm>
             <a:custGeom>
               <a:avLst/>
               <a:pathLst>
-                <a:path w="0" h="21303">
+                <a:path w="0" h="17226">
                   <a:moveTo>
-                    <a:pt x="0" y="21303"/>
+                    <a:pt x="0" y="17226"/>
                   </a:moveTo>
                   <a:lnTo>
                     <a:pt x="0" y="0"/>
@@ -6821,39 +6821,39 @@
           </p:nvSpPr>
           <p:spPr>
             <a:xfrm>
-              <a:off x="5474924" y="3976825"/>
-              <a:ext cx="3972763" cy="590101"/>
+              <a:off x="3280206" y="2589724"/>
+              <a:ext cx="3972763" cy="477175"/>
             </a:xfrm>
             <a:custGeom>
               <a:avLst/>
               <a:pathLst>
-                <a:path w="3972763" h="590101">
+                <a:path w="3972763" h="477175">
                   <a:moveTo>
-                    <a:pt x="0" y="590101"/>
+                    <a:pt x="0" y="477175"/>
                   </a:moveTo>
                   <a:lnTo>
-                    <a:pt x="496595" y="393973"/>
-                  </a:lnTo>
-                  <a:lnTo>
-                    <a:pt x="993190" y="143788"/>
-                  </a:lnTo>
-                  <a:lnTo>
-                    <a:pt x="1489786" y="62800"/>
-                  </a:lnTo>
-                  <a:lnTo>
-                    <a:pt x="1986381" y="56894"/>
-                  </a:lnTo>
-                  <a:lnTo>
-                    <a:pt x="2482977" y="44809"/>
-                  </a:lnTo>
-                  <a:lnTo>
-                    <a:pt x="2979572" y="28440"/>
+                    <a:pt x="496595" y="318579"/>
+                  </a:lnTo>
+                  <a:lnTo>
+                    <a:pt x="993190" y="116271"/>
+                  </a:lnTo>
+                  <a:lnTo>
+                    <a:pt x="1489786" y="50782"/>
+                  </a:lnTo>
+                  <a:lnTo>
+                    <a:pt x="1986381" y="46006"/>
+                  </a:lnTo>
+                  <a:lnTo>
+                    <a:pt x="2482977" y="36234"/>
+                  </a:lnTo>
+                  <a:lnTo>
+                    <a:pt x="2979572" y="22998"/>
                   </a:lnTo>
                   <a:lnTo>
                     <a:pt x="3476167" y="0"/>
                   </a:lnTo>
                   <a:lnTo>
-                    <a:pt x="3972763" y="72143"/>
+                    <a:pt x="3972763" y="58337"/>
                   </a:lnTo>
                 </a:path>
               </a:pathLst>
@@ -6882,36 +6882,36 @@
           </p:nvSpPr>
           <p:spPr>
             <a:xfrm>
-              <a:off x="5524584" y="4140217"/>
-              <a:ext cx="3972763" cy="647693"/>
+              <a:off x="3329865" y="2721848"/>
+              <a:ext cx="3972763" cy="523745"/>
             </a:xfrm>
             <a:custGeom>
               <a:avLst/>
               <a:pathLst>
-                <a:path w="3972763" h="647693">
+                <a:path w="3972763" h="523745">
                   <a:moveTo>
-                    <a:pt x="0" y="647693"/>
+                    <a:pt x="0" y="523745"/>
                   </a:moveTo>
                   <a:lnTo>
-                    <a:pt x="496595" y="393398"/>
-                  </a:lnTo>
-                  <a:lnTo>
-                    <a:pt x="993190" y="161746"/>
-                  </a:lnTo>
-                  <a:lnTo>
-                    <a:pt x="1489786" y="125224"/>
-                  </a:lnTo>
-                  <a:lnTo>
-                    <a:pt x="1986381" y="129187"/>
-                  </a:lnTo>
-                  <a:lnTo>
-                    <a:pt x="2482977" y="106746"/>
-                  </a:lnTo>
-                  <a:lnTo>
-                    <a:pt x="2979572" y="51353"/>
-                  </a:lnTo>
-                  <a:lnTo>
-                    <a:pt x="3476167" y="37906"/>
+                    <a:pt x="496595" y="318114"/>
+                  </a:lnTo>
+                  <a:lnTo>
+                    <a:pt x="993190" y="130793"/>
+                  </a:lnTo>
+                  <a:lnTo>
+                    <a:pt x="1489786" y="101260"/>
+                  </a:lnTo>
+                  <a:lnTo>
+                    <a:pt x="1986381" y="104464"/>
+                  </a:lnTo>
+                  <a:lnTo>
+                    <a:pt x="2482977" y="86318"/>
+                  </a:lnTo>
+                  <a:lnTo>
+                    <a:pt x="2979572" y="41525"/>
+                  </a:lnTo>
+                  <a:lnTo>
+                    <a:pt x="3476167" y="30652"/>
                   </a:lnTo>
                   <a:lnTo>
                     <a:pt x="3972763" y="0"/>
@@ -6943,7 +6943,7 @@
           </p:nvSpPr>
           <p:spPr>
             <a:xfrm>
-              <a:off x="5251456" y="3495298"/>
+              <a:off x="3056738" y="2156241"/>
               <a:ext cx="4965954" cy="230468"/>
             </a:xfrm>
             <a:prstGeom prst="rect">
@@ -6969,7 +6969,7 @@
           </p:nvSpPr>
           <p:spPr>
             <a:xfrm>
-              <a:off x="7571883" y="3563919"/>
+              <a:off x="5377165" y="2224863"/>
               <a:ext cx="325100" cy="90249"/>
             </a:xfrm>
             <a:prstGeom prst="rect">
@@ -7015,7 +7015,7 @@
           </p:nvSpPr>
           <p:spPr>
             <a:xfrm>
-              <a:off x="5251456" y="2000684"/>
+              <a:off x="3056738" y="890228"/>
               <a:ext cx="4965954" cy="230468"/>
             </a:xfrm>
             <a:prstGeom prst="rect">
@@ -7041,7 +7041,7 @@
           </p:nvSpPr>
           <p:spPr>
             <a:xfrm>
-              <a:off x="7422609" y="2046624"/>
+              <a:off x="5227890" y="936168"/>
               <a:ext cx="623649" cy="112930"/>
             </a:xfrm>
             <a:prstGeom prst="rect">
@@ -7087,7 +7087,7 @@
           </p:nvSpPr>
           <p:spPr>
             <a:xfrm>
-              <a:off x="5499754" y="4920322"/>
+              <a:off x="3305035" y="3352666"/>
               <a:ext cx="0" cy="34794"/>
             </a:xfrm>
             <a:custGeom>
@@ -7127,7 +7127,7 @@
           </p:nvSpPr>
           <p:spPr>
             <a:xfrm>
-              <a:off x="5996349" y="4920322"/>
+              <a:off x="3801631" y="3352666"/>
               <a:ext cx="0" cy="34794"/>
             </a:xfrm>
             <a:custGeom>
@@ -7167,7 +7167,7 @@
           </p:nvSpPr>
           <p:spPr>
             <a:xfrm>
-              <a:off x="6492945" y="4920322"/>
+              <a:off x="4298226" y="3352666"/>
               <a:ext cx="0" cy="34794"/>
             </a:xfrm>
             <a:custGeom>
@@ -7207,7 +7207,7 @@
           </p:nvSpPr>
           <p:spPr>
             <a:xfrm>
-              <a:off x="6989540" y="4920322"/>
+              <a:off x="4794822" y="3352666"/>
               <a:ext cx="0" cy="34794"/>
             </a:xfrm>
             <a:custGeom>
@@ -7247,7 +7247,7 @@
           </p:nvSpPr>
           <p:spPr>
             <a:xfrm>
-              <a:off x="7486136" y="4920322"/>
+              <a:off x="5291417" y="3352666"/>
               <a:ext cx="0" cy="34794"/>
             </a:xfrm>
             <a:custGeom>
@@ -7287,7 +7287,7 @@
           </p:nvSpPr>
           <p:spPr>
             <a:xfrm>
-              <a:off x="7982731" y="4920322"/>
+              <a:off x="5788013" y="3352666"/>
               <a:ext cx="0" cy="34794"/>
             </a:xfrm>
             <a:custGeom>
@@ -7327,7 +7327,7 @@
           </p:nvSpPr>
           <p:spPr>
             <a:xfrm>
-              <a:off x="8479326" y="4920322"/>
+              <a:off x="6284608" y="3352666"/>
               <a:ext cx="0" cy="34794"/>
             </a:xfrm>
             <a:custGeom>
@@ -7367,7 +7367,7 @@
           </p:nvSpPr>
           <p:spPr>
             <a:xfrm>
-              <a:off x="8975922" y="4920322"/>
+              <a:off x="6781203" y="3352666"/>
               <a:ext cx="0" cy="34794"/>
             </a:xfrm>
             <a:custGeom>
@@ -7407,7 +7407,7 @@
           </p:nvSpPr>
           <p:spPr>
             <a:xfrm>
-              <a:off x="9472517" y="4920322"/>
+              <a:off x="7277799" y="3352666"/>
               <a:ext cx="0" cy="34794"/>
             </a:xfrm>
             <a:custGeom>
@@ -7447,7 +7447,7 @@
           </p:nvSpPr>
           <p:spPr>
             <a:xfrm>
-              <a:off x="9969113" y="4920322"/>
+              <a:off x="7774394" y="3352666"/>
               <a:ext cx="0" cy="34794"/>
             </a:xfrm>
             <a:custGeom>
@@ -7487,7 +7487,7 @@
           </p:nvSpPr>
           <p:spPr>
             <a:xfrm>
-              <a:off x="5411648" y="4981107"/>
+              <a:off x="3216929" y="3413450"/>
               <a:ext cx="176212" cy="89118"/>
             </a:xfrm>
             <a:prstGeom prst="rect">
@@ -7533,7 +7533,7 @@
           </p:nvSpPr>
           <p:spPr>
             <a:xfrm>
-              <a:off x="5840437" y="4981107"/>
+              <a:off x="3645719" y="3413450"/>
               <a:ext cx="311824" cy="89118"/>
             </a:xfrm>
             <a:prstGeom prst="rect">
@@ -7579,7 +7579,7 @@
           </p:nvSpPr>
           <p:spPr>
             <a:xfrm>
-              <a:off x="6337032" y="4981107"/>
+              <a:off x="4142314" y="3413450"/>
               <a:ext cx="311824" cy="89118"/>
             </a:xfrm>
             <a:prstGeom prst="rect">
@@ -7625,7 +7625,7 @@
           </p:nvSpPr>
           <p:spPr>
             <a:xfrm>
-              <a:off x="6833628" y="4981047"/>
+              <a:off x="4638909" y="3413391"/>
               <a:ext cx="311824" cy="89177"/>
             </a:xfrm>
             <a:prstGeom prst="rect">
@@ -7671,7 +7671,7 @@
           </p:nvSpPr>
           <p:spPr>
             <a:xfrm>
-              <a:off x="7330223" y="4981107"/>
+              <a:off x="5135505" y="3413450"/>
               <a:ext cx="311824" cy="89118"/>
             </a:xfrm>
             <a:prstGeom prst="rect">
@@ -7717,7 +7717,7 @@
           </p:nvSpPr>
           <p:spPr>
             <a:xfrm>
-              <a:off x="7826819" y="4981107"/>
+              <a:off x="5632100" y="3413450"/>
               <a:ext cx="311824" cy="89118"/>
             </a:xfrm>
             <a:prstGeom prst="rect">
@@ -7763,7 +7763,7 @@
           </p:nvSpPr>
           <p:spPr>
             <a:xfrm>
-              <a:off x="8323414" y="4981107"/>
+              <a:off x="6128696" y="3413450"/>
               <a:ext cx="311824" cy="89118"/>
             </a:xfrm>
             <a:prstGeom prst="rect">
@@ -7809,7 +7809,7 @@
           </p:nvSpPr>
           <p:spPr>
             <a:xfrm>
-              <a:off x="8820010" y="4981107"/>
+              <a:off x="6625291" y="3413450"/>
               <a:ext cx="311824" cy="89118"/>
             </a:xfrm>
             <a:prstGeom prst="rect">
@@ -7855,7 +7855,7 @@
           </p:nvSpPr>
           <p:spPr>
             <a:xfrm>
-              <a:off x="9369112" y="4981107"/>
+              <a:off x="7174393" y="3413450"/>
               <a:ext cx="206811" cy="89118"/>
             </a:xfrm>
             <a:prstGeom prst="rect">
@@ -7901,7 +7901,7 @@
           </p:nvSpPr>
           <p:spPr>
             <a:xfrm>
-              <a:off x="9870827" y="4979916"/>
+              <a:off x="7676108" y="3412260"/>
               <a:ext cx="196572" cy="90308"/>
             </a:xfrm>
             <a:prstGeom prst="rect">
@@ -7947,7 +7947,7 @@
           </p:nvSpPr>
           <p:spPr>
             <a:xfrm>
-              <a:off x="5121020" y="3381775"/>
+              <a:off x="2926301" y="2042718"/>
               <a:ext cx="67806" cy="87570"/>
             </a:xfrm>
             <a:prstGeom prst="rect">
@@ -7993,7 +7993,7 @@
           </p:nvSpPr>
           <p:spPr>
             <a:xfrm>
-              <a:off x="5053214" y="2954605"/>
+              <a:off x="2858495" y="1696999"/>
               <a:ext cx="135612" cy="89118"/>
             </a:xfrm>
             <a:prstGeom prst="rect">
@@ -8039,7 +8039,7 @@
           </p:nvSpPr>
           <p:spPr>
             <a:xfrm>
-              <a:off x="5053214" y="2691089"/>
+              <a:off x="2858495" y="1483912"/>
               <a:ext cx="135612" cy="89118"/>
             </a:xfrm>
             <a:prstGeom prst="rect">
@@ -8085,7 +8085,7 @@
           </p:nvSpPr>
           <p:spPr>
             <a:xfrm>
-              <a:off x="5053214" y="2492690"/>
+              <a:off x="2858495" y="1323479"/>
               <a:ext cx="135612" cy="89118"/>
             </a:xfrm>
             <a:prstGeom prst="rect">
@@ -8131,7 +8131,7 @@
           </p:nvSpPr>
           <p:spPr>
             <a:xfrm>
-              <a:off x="5053214" y="2328823"/>
+              <a:off x="2858495" y="1190971"/>
               <a:ext cx="135612" cy="89118"/>
             </a:xfrm>
             <a:prstGeom prst="rect">
@@ -8177,7 +8177,7 @@
           </p:nvSpPr>
           <p:spPr>
             <a:xfrm>
-              <a:off x="5053214" y="2185611"/>
+              <a:off x="2858495" y="1075155"/>
               <a:ext cx="135612" cy="89177"/>
             </a:xfrm>
             <a:prstGeom prst="rect">
@@ -8223,7 +8223,7 @@
           </p:nvSpPr>
           <p:spPr>
             <a:xfrm>
-              <a:off x="5216662" y="3425709"/>
+              <a:off x="3021943" y="2086652"/>
               <a:ext cx="34794" cy="0"/>
             </a:xfrm>
             <a:custGeom>
@@ -8263,7 +8263,7 @@
           </p:nvSpPr>
           <p:spPr>
             <a:xfrm>
-              <a:off x="5216662" y="3000087"/>
+              <a:off x="3021943" y="1742481"/>
               <a:ext cx="34794" cy="0"/>
             </a:xfrm>
             <a:custGeom>
@@ -8303,7 +8303,7 @@
           </p:nvSpPr>
           <p:spPr>
             <a:xfrm>
-              <a:off x="5216662" y="2736571"/>
+              <a:off x="3021943" y="1529394"/>
               <a:ext cx="34794" cy="0"/>
             </a:xfrm>
             <a:custGeom>
@@ -8343,7 +8343,7 @@
           </p:nvSpPr>
           <p:spPr>
             <a:xfrm>
-              <a:off x="5216662" y="2538171"/>
+              <a:off x="3021943" y="1368961"/>
               <a:ext cx="34794" cy="0"/>
             </a:xfrm>
             <a:custGeom>
@@ -8383,7 +8383,7 @@
           </p:nvSpPr>
           <p:spPr>
             <a:xfrm>
-              <a:off x="5216662" y="2374304"/>
+              <a:off x="3021943" y="1236453"/>
               <a:ext cx="34794" cy="0"/>
             </a:xfrm>
             <a:custGeom>
@@ -8423,7 +8423,7 @@
           </p:nvSpPr>
           <p:spPr>
             <a:xfrm>
-              <a:off x="5216662" y="2231153"/>
+              <a:off x="3021943" y="1120696"/>
               <a:ext cx="34794" cy="0"/>
             </a:xfrm>
             <a:custGeom>
@@ -8463,7 +8463,7 @@
           </p:nvSpPr>
           <p:spPr>
             <a:xfrm>
-              <a:off x="5121020" y="4876388"/>
+              <a:off x="2926301" y="3308732"/>
               <a:ext cx="67806" cy="87570"/>
             </a:xfrm>
             <a:prstGeom prst="rect">
@@ -8509,7 +8509,7 @@
           </p:nvSpPr>
           <p:spPr>
             <a:xfrm>
-              <a:off x="5053214" y="4449218"/>
+              <a:off x="2858495" y="2963012"/>
               <a:ext cx="135612" cy="89118"/>
             </a:xfrm>
             <a:prstGeom prst="rect">
@@ -8555,7 +8555,7 @@
           </p:nvSpPr>
           <p:spPr>
             <a:xfrm>
-              <a:off x="5053214" y="4185703"/>
+              <a:off x="2858495" y="2749925"/>
               <a:ext cx="135612" cy="89118"/>
             </a:xfrm>
             <a:prstGeom prst="rect">
@@ -8601,7 +8601,7 @@
           </p:nvSpPr>
           <p:spPr>
             <a:xfrm>
-              <a:off x="5053214" y="3987303"/>
+              <a:off x="2858495" y="2589493"/>
               <a:ext cx="135612" cy="89118"/>
             </a:xfrm>
             <a:prstGeom prst="rect">
@@ -8647,7 +8647,7 @@
           </p:nvSpPr>
           <p:spPr>
             <a:xfrm>
-              <a:off x="5053214" y="3823436"/>
+              <a:off x="2858495" y="2456985"/>
               <a:ext cx="135612" cy="89118"/>
             </a:xfrm>
             <a:prstGeom prst="rect">
@@ -8693,7 +8693,7 @@
           </p:nvSpPr>
           <p:spPr>
             <a:xfrm>
-              <a:off x="5053214" y="3680225"/>
+              <a:off x="2858495" y="2341168"/>
               <a:ext cx="135612" cy="89177"/>
             </a:xfrm>
             <a:prstGeom prst="rect">
@@ -8739,7 +8739,7 @@
           </p:nvSpPr>
           <p:spPr>
             <a:xfrm>
-              <a:off x="5216662" y="4920322"/>
+              <a:off x="3021943" y="3352666"/>
               <a:ext cx="34794" cy="0"/>
             </a:xfrm>
             <a:custGeom>
@@ -8779,7 +8779,7 @@
           </p:nvSpPr>
           <p:spPr>
             <a:xfrm>
-              <a:off x="5216662" y="4494700"/>
+              <a:off x="3021943" y="3008494"/>
               <a:ext cx="34794" cy="0"/>
             </a:xfrm>
             <a:custGeom>
@@ -8819,7 +8819,7 @@
           </p:nvSpPr>
           <p:spPr>
             <a:xfrm>
-              <a:off x="5216662" y="4231185"/>
+              <a:off x="3021943" y="2795407"/>
               <a:ext cx="34794" cy="0"/>
             </a:xfrm>
             <a:custGeom>
@@ -8859,7 +8859,7 @@
           </p:nvSpPr>
           <p:spPr>
             <a:xfrm>
-              <a:off x="5216662" y="4032785"/>
+              <a:off x="3021943" y="2634975"/>
               <a:ext cx="34794" cy="0"/>
             </a:xfrm>
             <a:custGeom>
@@ -8899,7 +8899,7 @@
           </p:nvSpPr>
           <p:spPr>
             <a:xfrm>
-              <a:off x="5216662" y="3868918"/>
+              <a:off x="3021943" y="2502467"/>
               <a:ext cx="34794" cy="0"/>
             </a:xfrm>
             <a:custGeom>
@@ -8939,7 +8939,7 @@
           </p:nvSpPr>
           <p:spPr>
             <a:xfrm>
-              <a:off x="5216662" y="3725766"/>
+              <a:off x="3021943" y="2386710"/>
               <a:ext cx="34794" cy="0"/>
             </a:xfrm>
             <a:custGeom>
@@ -8979,7 +8979,7 @@
           </p:nvSpPr>
           <p:spPr>
             <a:xfrm rot="-5400000">
-              <a:off x="4026854" y="3504226"/>
+              <a:off x="1832135" y="2165169"/>
               <a:ext cx="1761827" cy="143023"/>
             </a:xfrm>
             <a:prstGeom prst="rect">
@@ -9025,7 +9025,7 @@
           </p:nvSpPr>
           <p:spPr>
             <a:xfrm>
-              <a:off x="9093823" y="4267853"/>
+              <a:off x="6899104" y="2761919"/>
               <a:ext cx="757388" cy="578862"/>
             </a:xfrm>
             <a:prstGeom prst="rect">
@@ -9051,7 +9051,7 @@
           </p:nvSpPr>
           <p:spPr>
             <a:xfrm>
-              <a:off x="9163412" y="4346276"/>
+              <a:off x="6968694" y="2840342"/>
               <a:ext cx="513822" cy="64678"/>
             </a:xfrm>
             <a:prstGeom prst="rect">
@@ -9097,7 +9097,7 @@
           </p:nvSpPr>
           <p:spPr>
             <a:xfrm>
-              <a:off x="9163412" y="4424621"/>
+              <a:off x="6968694" y="2918687"/>
               <a:ext cx="622734" cy="82345"/>
             </a:xfrm>
             <a:prstGeom prst="rect">
@@ -9143,7 +9143,7 @@
           </p:nvSpPr>
           <p:spPr>
             <a:xfrm>
-              <a:off x="9163412" y="4561126"/>
+              <a:off x="6968694" y="3055192"/>
               <a:ext cx="107999" cy="107999"/>
             </a:xfrm>
             <a:prstGeom prst="rect">
@@ -9164,7 +9164,7 @@
           </p:nvSpPr>
           <p:spPr>
             <a:xfrm>
-              <a:off x="9192586" y="4590301"/>
+              <a:off x="6997868" y="3084366"/>
               <a:ext cx="49651" cy="49651"/>
             </a:xfrm>
             <a:prstGeom prst="ellipse">
@@ -9199,15 +9199,15 @@
           </p:nvSpPr>
           <p:spPr>
             <a:xfrm>
-              <a:off x="9217412" y="4571926"/>
-              <a:ext cx="0" cy="86400"/>
+              <a:off x="7022694" y="3065992"/>
+              <a:ext cx="0" cy="86399"/>
             </a:xfrm>
             <a:custGeom>
               <a:avLst/>
               <a:pathLst>
-                <a:path w="0" h="86400">
+                <a:path w="0" h="86399">
                   <a:moveTo>
-                    <a:pt x="0" y="86400"/>
+                    <a:pt x="0" y="86399"/>
                   </a:moveTo>
                   <a:lnTo>
                     <a:pt x="0" y="0"/>
@@ -9239,7 +9239,7 @@
           </p:nvSpPr>
           <p:spPr>
             <a:xfrm>
-              <a:off x="9174212" y="4615126"/>
+              <a:off x="6979494" y="3109192"/>
               <a:ext cx="86399" cy="0"/>
             </a:xfrm>
             <a:custGeom>
@@ -9279,7 +9279,7 @@
           </p:nvSpPr>
           <p:spPr>
             <a:xfrm>
-              <a:off x="9163412" y="4669126"/>
+              <a:off x="6968694" y="3163192"/>
               <a:ext cx="107999" cy="107999"/>
             </a:xfrm>
             <a:prstGeom prst="rect">
@@ -9300,7 +9300,7 @@
           </p:nvSpPr>
           <p:spPr>
             <a:xfrm>
-              <a:off x="9192586" y="4698301"/>
+              <a:off x="6997868" y="3192366"/>
               <a:ext cx="49651" cy="49651"/>
             </a:xfrm>
             <a:prstGeom prst="ellipse">
@@ -9335,7 +9335,7 @@
           </p:nvSpPr>
           <p:spPr>
             <a:xfrm>
-              <a:off x="9217412" y="4679926"/>
+              <a:off x="7022694" y="3173992"/>
               <a:ext cx="0" cy="86399"/>
             </a:xfrm>
             <a:custGeom>
@@ -9375,7 +9375,7 @@
           </p:nvSpPr>
           <p:spPr>
             <a:xfrm>
-              <a:off x="9174212" y="4723126"/>
+              <a:off x="6979494" y="3217192"/>
               <a:ext cx="86399" cy="0"/>
             </a:xfrm>
             <a:custGeom>
@@ -9415,7 +9415,7 @@
           </p:nvSpPr>
           <p:spPr>
             <a:xfrm>
-              <a:off x="9315696" y="4585956"/>
+              <a:off x="7120977" y="3080022"/>
               <a:ext cx="165124" cy="56443"/>
             </a:xfrm>
             <a:prstGeom prst="rect">
@@ -9461,7 +9461,7 @@
           </p:nvSpPr>
           <p:spPr>
             <a:xfrm>
-              <a:off x="9315696" y="4694961"/>
+              <a:off x="7120977" y="3189026"/>
               <a:ext cx="173682" cy="55438"/>
             </a:xfrm>
             <a:prstGeom prst="rect">
@@ -9507,8 +9507,8 @@
           </p:nvSpPr>
           <p:spPr>
             <a:xfrm>
-              <a:off x="4800600" y="5349081"/>
-              <a:ext cx="5486399" cy="3657600"/>
+              <a:off x="2605881" y="3781425"/>
+              <a:ext cx="5486399" cy="3200400"/>
             </a:xfrm>
             <a:prstGeom prst="rect">
               <a:avLst/>
@@ -9533,7 +9533,7 @@
           </p:nvSpPr>
           <p:spPr>
             <a:xfrm>
-              <a:off x="5286762" y="7083309"/>
+              <a:off x="3092044" y="5287052"/>
               <a:ext cx="4930648" cy="0"/>
             </a:xfrm>
             <a:custGeom>
@@ -9576,7 +9576,7 @@
           </p:nvSpPr>
           <p:spPr>
             <a:xfrm>
-              <a:off x="5286762" y="6742007"/>
+              <a:off x="3092044" y="5011065"/>
               <a:ext cx="4930648" cy="0"/>
             </a:xfrm>
             <a:custGeom>
@@ -9619,7 +9619,7 @@
           </p:nvSpPr>
           <p:spPr>
             <a:xfrm>
-              <a:off x="5286762" y="6400705"/>
+              <a:off x="3092044" y="4735077"/>
               <a:ext cx="4930648" cy="0"/>
             </a:xfrm>
             <a:custGeom>
@@ -9662,7 +9662,7 @@
           </p:nvSpPr>
           <p:spPr>
             <a:xfrm>
-              <a:off x="5286762" y="6059404"/>
+              <a:off x="3092044" y="4459090"/>
               <a:ext cx="4930648" cy="0"/>
             </a:xfrm>
             <a:custGeom>
@@ -9705,7 +9705,7 @@
           </p:nvSpPr>
           <p:spPr>
             <a:xfrm>
-              <a:off x="5508469" y="6215984"/>
+              <a:off x="3313750" y="4580955"/>
               <a:ext cx="49651" cy="49651"/>
             </a:xfrm>
             <a:prstGeom prst="ellipse">
@@ -9740,7 +9740,7 @@
           </p:nvSpPr>
           <p:spPr>
             <a:xfrm>
-              <a:off x="6001534" y="6463431"/>
+              <a:off x="3806815" y="4781049"/>
               <a:ext cx="49651" cy="49651"/>
             </a:xfrm>
             <a:prstGeom prst="ellipse">
@@ -9775,7 +9775,7 @@
           </p:nvSpPr>
           <p:spPr>
             <a:xfrm>
-              <a:off x="6494598" y="6387314"/>
+              <a:off x="4299880" y="4719498"/>
               <a:ext cx="49651" cy="49651"/>
             </a:xfrm>
             <a:prstGeom prst="ellipse">
@@ -9810,7 +9810,7 @@
           </p:nvSpPr>
           <p:spPr>
             <a:xfrm>
-              <a:off x="6987663" y="6194272"/>
+              <a:off x="4792945" y="4563398"/>
               <a:ext cx="49651" cy="49651"/>
             </a:xfrm>
             <a:prstGeom prst="ellipse">
@@ -9845,7 +9845,7 @@
           </p:nvSpPr>
           <p:spPr>
             <a:xfrm>
-              <a:off x="7480728" y="6149342"/>
+              <a:off x="5286009" y="4527066"/>
               <a:ext cx="49651" cy="49651"/>
             </a:xfrm>
             <a:prstGeom prst="ellipse">
@@ -9880,7 +9880,7 @@
           </p:nvSpPr>
           <p:spPr>
             <a:xfrm>
-              <a:off x="7973793" y="6196468"/>
+              <a:off x="5779074" y="4565173"/>
               <a:ext cx="49651" cy="49651"/>
             </a:xfrm>
             <a:prstGeom prst="ellipse">
@@ -9915,7 +9915,7 @@
           </p:nvSpPr>
           <p:spPr>
             <a:xfrm>
-              <a:off x="8466858" y="6366545"/>
+              <a:off x="6272139" y="4702703"/>
               <a:ext cx="49651" cy="49651"/>
             </a:xfrm>
             <a:prstGeom prst="ellipse">
@@ -9950,7 +9950,7 @@
           </p:nvSpPr>
           <p:spPr>
             <a:xfrm>
-              <a:off x="8959922" y="6302572"/>
+              <a:off x="6765204" y="4650973"/>
               <a:ext cx="49651" cy="49651"/>
             </a:xfrm>
             <a:prstGeom prst="ellipse">
@@ -9985,7 +9985,7 @@
           </p:nvSpPr>
           <p:spPr>
             <a:xfrm>
-              <a:off x="9452987" y="6735179"/>
+              <a:off x="7258269" y="5000793"/>
               <a:ext cx="49651" cy="49651"/>
             </a:xfrm>
             <a:prstGeom prst="ellipse">
@@ -10020,7 +10020,7 @@
           </p:nvSpPr>
           <p:spPr>
             <a:xfrm>
-              <a:off x="9946052" y="6341104"/>
+              <a:off x="7751334" y="4682131"/>
               <a:ext cx="49651" cy="49651"/>
             </a:xfrm>
             <a:prstGeom prst="ellipse">
@@ -10055,15 +10055,15 @@
           </p:nvSpPr>
           <p:spPr>
             <a:xfrm>
-              <a:off x="5533295" y="5972458"/>
-              <a:ext cx="0" cy="511144"/>
+              <a:off x="3338576" y="4388783"/>
+              <a:ext cx="0" cy="413327"/>
             </a:xfrm>
             <a:custGeom>
               <a:avLst/>
               <a:pathLst>
-                <a:path w="0" h="511144">
+                <a:path w="0" h="413327">
                   <a:moveTo>
-                    <a:pt x="0" y="511144"/>
+                    <a:pt x="0" y="413327"/>
                   </a:moveTo>
                   <a:lnTo>
                     <a:pt x="0" y="0"/>
@@ -10095,15 +10095,15 @@
           </p:nvSpPr>
           <p:spPr>
             <a:xfrm>
-              <a:off x="6026359" y="6262157"/>
-              <a:ext cx="0" cy="431976"/>
+              <a:off x="3831641" y="4623043"/>
+              <a:ext cx="0" cy="349309"/>
             </a:xfrm>
             <a:custGeom>
               <a:avLst/>
               <a:pathLst>
-                <a:path w="0" h="431976">
+                <a:path w="0" h="349309">
                   <a:moveTo>
-                    <a:pt x="0" y="431976"/>
+                    <a:pt x="0" y="349309"/>
                   </a:moveTo>
                   <a:lnTo>
                     <a:pt x="0" y="0"/>
@@ -10135,15 +10135,15 @@
           </p:nvSpPr>
           <p:spPr>
             <a:xfrm>
-              <a:off x="6519424" y="6174817"/>
-              <a:ext cx="0" cy="453107"/>
+              <a:off x="4324706" y="4552417"/>
+              <a:ext cx="0" cy="366397"/>
             </a:xfrm>
             <a:custGeom>
               <a:avLst/>
               <a:pathLst>
-                <a:path w="0" h="453107">
+                <a:path w="0" h="366397">
                   <a:moveTo>
-                    <a:pt x="0" y="453107"/>
+                    <a:pt x="0" y="366397"/>
                   </a:moveTo>
                   <a:lnTo>
                     <a:pt x="0" y="0"/>
@@ -10175,15 +10175,15 @@
           </p:nvSpPr>
           <p:spPr>
             <a:xfrm>
-              <a:off x="7012489" y="5965181"/>
-              <a:ext cx="0" cy="485008"/>
+              <a:off x="4817771" y="4382899"/>
+              <a:ext cx="0" cy="392193"/>
             </a:xfrm>
             <a:custGeom>
               <a:avLst/>
               <a:pathLst>
-                <a:path w="0" h="485008">
+                <a:path w="0" h="392193">
                   <a:moveTo>
-                    <a:pt x="0" y="485008"/>
+                    <a:pt x="0" y="392193"/>
                   </a:moveTo>
                   <a:lnTo>
                     <a:pt x="0" y="0"/>
@@ -10215,15 +10215,15 @@
           </p:nvSpPr>
           <p:spPr>
             <a:xfrm>
-              <a:off x="7505554" y="5918993"/>
-              <a:ext cx="0" cy="487669"/>
+              <a:off x="5310835" y="4345549"/>
+              <a:ext cx="0" cy="394344"/>
             </a:xfrm>
             <a:custGeom>
               <a:avLst/>
               <a:pathLst>
-                <a:path w="0" h="487669">
+                <a:path w="0" h="394344">
                   <a:moveTo>
-                    <a:pt x="0" y="487669"/>
+                    <a:pt x="0" y="394344"/>
                   </a:moveTo>
                   <a:lnTo>
                     <a:pt x="0" y="0"/>
@@ -10255,15 +10255,15 @@
           </p:nvSpPr>
           <p:spPr>
             <a:xfrm>
-              <a:off x="7998619" y="5965209"/>
-              <a:ext cx="0" cy="488951"/>
+              <a:off x="5803900" y="4382921"/>
+              <a:ext cx="0" cy="395381"/>
             </a:xfrm>
             <a:custGeom>
               <a:avLst/>
               <a:pathLst>
-                <a:path w="0" h="488951">
+                <a:path w="0" h="395381">
                   <a:moveTo>
-                    <a:pt x="0" y="488951"/>
+                    <a:pt x="0" y="395381"/>
                   </a:moveTo>
                   <a:lnTo>
                     <a:pt x="0" y="0"/>
@@ -10295,15 +10295,15 @@
           </p:nvSpPr>
           <p:spPr>
             <a:xfrm>
-              <a:off x="8491684" y="6121077"/>
-              <a:ext cx="0" cy="513210"/>
+              <a:off x="6296965" y="4508961"/>
+              <a:ext cx="0" cy="414998"/>
             </a:xfrm>
             <a:custGeom>
               <a:avLst/>
               <a:pathLst>
-                <a:path w="0" h="513210">
+                <a:path w="0" h="414998">
                   <a:moveTo>
-                    <a:pt x="0" y="513210"/>
+                    <a:pt x="0" y="414998"/>
                   </a:moveTo>
                   <a:lnTo>
                     <a:pt x="0" y="0"/>
@@ -10335,15 +10335,15 @@
           </p:nvSpPr>
           <p:spPr>
             <a:xfrm>
-              <a:off x="8984748" y="5971255"/>
-              <a:ext cx="0" cy="667284"/>
+              <a:off x="6790030" y="4387810"/>
+              <a:ext cx="0" cy="539587"/>
             </a:xfrm>
             <a:custGeom>
               <a:avLst/>
               <a:pathLst>
-                <a:path w="0" h="667284">
+                <a:path w="0" h="539587">
                   <a:moveTo>
-                    <a:pt x="0" y="667284"/>
+                    <a:pt x="0" y="539587"/>
                   </a:moveTo>
                   <a:lnTo>
                     <a:pt x="0" y="0"/>
@@ -10375,15 +10375,15 @@
           </p:nvSpPr>
           <p:spPr>
             <a:xfrm>
-              <a:off x="9477813" y="6336605"/>
-              <a:ext cx="0" cy="746703"/>
+              <a:off x="7283095" y="4683244"/>
+              <a:ext cx="0" cy="603808"/>
             </a:xfrm>
             <a:custGeom>
               <a:avLst/>
               <a:pathLst>
-                <a:path w="0" h="746703">
+                <a:path w="0" h="603808">
                   <a:moveTo>
-                    <a:pt x="0" y="746703"/>
+                    <a:pt x="0" y="603808"/>
                   </a:moveTo>
                   <a:lnTo>
                     <a:pt x="0" y="0"/>
@@ -10415,15 +10415,15 @@
           </p:nvSpPr>
           <p:spPr>
             <a:xfrm>
-              <a:off x="9970878" y="6141685"/>
-              <a:ext cx="0" cy="429500"/>
+              <a:off x="7776160" y="4525625"/>
+              <a:ext cx="0" cy="347307"/>
             </a:xfrm>
             <a:custGeom>
               <a:avLst/>
               <a:pathLst>
-                <a:path w="0" h="429500">
+                <a:path w="0" h="347307">
                   <a:moveTo>
-                    <a:pt x="0" y="429500"/>
+                    <a:pt x="0" y="347307"/>
                   </a:moveTo>
                   <a:lnTo>
                     <a:pt x="0" y="0"/>
@@ -10455,39 +10455,39 @@
           </p:nvSpPr>
           <p:spPr>
             <a:xfrm>
-              <a:off x="5533295" y="6174168"/>
-              <a:ext cx="3944518" cy="585836"/>
+              <a:off x="3338576" y="4551892"/>
+              <a:ext cx="3944518" cy="473726"/>
             </a:xfrm>
             <a:custGeom>
               <a:avLst/>
               <a:pathLst>
-                <a:path w="3944518" h="585836">
+                <a:path w="3944518" h="473726">
                   <a:moveTo>
-                    <a:pt x="0" y="66641"/>
+                    <a:pt x="0" y="53888"/>
                   </a:moveTo>
                   <a:lnTo>
-                    <a:pt x="493064" y="314089"/>
-                  </a:lnTo>
-                  <a:lnTo>
-                    <a:pt x="986129" y="237971"/>
-                  </a:lnTo>
-                  <a:lnTo>
-                    <a:pt x="1479194" y="44929"/>
+                    <a:pt x="493064" y="253982"/>
+                  </a:lnTo>
+                  <a:lnTo>
+                    <a:pt x="986129" y="192431"/>
+                  </a:lnTo>
+                  <a:lnTo>
+                    <a:pt x="1479194" y="36331"/>
                   </a:lnTo>
                   <a:lnTo>
                     <a:pt x="1972259" y="0"/>
                   </a:lnTo>
                   <a:lnTo>
-                    <a:pt x="2465324" y="47125"/>
-                  </a:lnTo>
-                  <a:lnTo>
-                    <a:pt x="2958388" y="217202"/>
-                  </a:lnTo>
-                  <a:lnTo>
-                    <a:pt x="3451453" y="153229"/>
-                  </a:lnTo>
-                  <a:lnTo>
-                    <a:pt x="3944518" y="585836"/>
+                    <a:pt x="2465324" y="38107"/>
+                  </a:lnTo>
+                  <a:lnTo>
+                    <a:pt x="2958388" y="175636"/>
+                  </a:lnTo>
+                  <a:lnTo>
+                    <a:pt x="3451453" y="123906"/>
+                  </a:lnTo>
+                  <a:lnTo>
+                    <a:pt x="3944518" y="473726"/>
                   </a:lnTo>
                 </a:path>
               </a:pathLst>
@@ -10516,7 +10516,7 @@
           </p:nvSpPr>
           <p:spPr>
             <a:xfrm>
-              <a:off x="5286762" y="7083309"/>
+              <a:off x="3092044" y="5287052"/>
               <a:ext cx="4930648" cy="0"/>
             </a:xfrm>
             <a:custGeom>
@@ -10559,7 +10559,7 @@
           </p:nvSpPr>
           <p:spPr>
             <a:xfrm>
-              <a:off x="5286762" y="8577922"/>
+              <a:off x="3092044" y="6553066"/>
               <a:ext cx="4930648" cy="0"/>
             </a:xfrm>
             <a:custGeom>
@@ -10602,7 +10602,7 @@
           </p:nvSpPr>
           <p:spPr>
             <a:xfrm>
-              <a:off x="5286762" y="8236621"/>
+              <a:off x="3092044" y="6277078"/>
               <a:ext cx="4930648" cy="0"/>
             </a:xfrm>
             <a:custGeom>
@@ -10645,7 +10645,7 @@
           </p:nvSpPr>
           <p:spPr>
             <a:xfrm>
-              <a:off x="5286762" y="7895319"/>
+              <a:off x="3092044" y="6001091"/>
               <a:ext cx="4930648" cy="0"/>
             </a:xfrm>
             <a:custGeom>
@@ -10688,7 +10688,7 @@
           </p:nvSpPr>
           <p:spPr>
             <a:xfrm>
-              <a:off x="5286762" y="7554017"/>
+              <a:off x="3092044" y="5725103"/>
               <a:ext cx="4930648" cy="0"/>
             </a:xfrm>
             <a:custGeom>
@@ -10731,7 +10731,7 @@
           </p:nvSpPr>
           <p:spPr>
             <a:xfrm>
-              <a:off x="5508469" y="7744275"/>
+              <a:off x="3313750" y="5874201"/>
               <a:ext cx="49651" cy="49651"/>
             </a:xfrm>
             <a:prstGeom prst="ellipse">
@@ -10766,7 +10766,7 @@
           </p:nvSpPr>
           <p:spPr>
             <a:xfrm>
-              <a:off x="6001534" y="7988453"/>
+              <a:off x="3806815" y="6071652"/>
               <a:ext cx="49651" cy="49651"/>
             </a:xfrm>
             <a:prstGeom prst="ellipse">
@@ -10801,7 +10801,7 @@
           </p:nvSpPr>
           <p:spPr>
             <a:xfrm>
-              <a:off x="6494598" y="7913341"/>
+              <a:off x="4299880" y="6010914"/>
               <a:ext cx="49651" cy="49651"/>
             </a:xfrm>
             <a:prstGeom prst="ellipse">
@@ -10836,7 +10836,7 @@
           </p:nvSpPr>
           <p:spPr>
             <a:xfrm>
-              <a:off x="6987663" y="7722850"/>
+              <a:off x="4792945" y="5856877"/>
               <a:ext cx="49651" cy="49651"/>
             </a:xfrm>
             <a:prstGeom prst="ellipse">
@@ -10871,7 +10871,7 @@
           </p:nvSpPr>
           <p:spPr>
             <a:xfrm>
-              <a:off x="7480728" y="7678514"/>
+              <a:off x="5286009" y="5821025"/>
               <a:ext cx="49651" cy="49651"/>
             </a:xfrm>
             <a:prstGeom prst="ellipse">
@@ -10906,7 +10906,7 @@
           </p:nvSpPr>
           <p:spPr>
             <a:xfrm>
-              <a:off x="7973793" y="7725017"/>
+              <a:off x="5779074" y="5858628"/>
               <a:ext cx="49651" cy="49651"/>
             </a:xfrm>
             <a:prstGeom prst="ellipse">
@@ -10941,7 +10941,7 @@
           </p:nvSpPr>
           <p:spPr>
             <a:xfrm>
-              <a:off x="8466858" y="7892847"/>
+              <a:off x="6272139" y="5994341"/>
               <a:ext cx="49651" cy="49651"/>
             </a:xfrm>
             <a:prstGeom prst="ellipse">
@@ -10976,7 +10976,7 @@
           </p:nvSpPr>
           <p:spPr>
             <a:xfrm>
-              <a:off x="8959922" y="7829719"/>
+              <a:off x="6765204" y="5943294"/>
               <a:ext cx="49651" cy="49651"/>
             </a:xfrm>
             <a:prstGeom prst="ellipse">
@@ -11011,7 +11011,7 @@
           </p:nvSpPr>
           <p:spPr>
             <a:xfrm>
-              <a:off x="9452987" y="8256611"/>
+              <a:off x="7258269" y="6288492"/>
               <a:ext cx="49651" cy="49651"/>
             </a:xfrm>
             <a:prstGeom prst="ellipse">
@@ -11046,7 +11046,7 @@
           </p:nvSpPr>
           <p:spPr>
             <a:xfrm>
-              <a:off x="9946052" y="7867742"/>
+              <a:off x="7751334" y="5974041"/>
               <a:ext cx="49651" cy="49651"/>
             </a:xfrm>
             <a:prstGeom prst="ellipse">
@@ -11081,15 +11081,15 @@
           </p:nvSpPr>
           <p:spPr>
             <a:xfrm>
-              <a:off x="5533295" y="7630664"/>
-              <a:ext cx="0" cy="269653"/>
+              <a:off x="3338576" y="5787082"/>
+              <a:ext cx="0" cy="218050"/>
             </a:xfrm>
             <a:custGeom>
               <a:avLst/>
               <a:pathLst>
-                <a:path w="0" h="269653">
+                <a:path w="0" h="218050">
                   <a:moveTo>
-                    <a:pt x="0" y="269653"/>
+                    <a:pt x="0" y="218050"/>
                   </a:moveTo>
                   <a:lnTo>
                     <a:pt x="0" y="0"/>
@@ -11121,15 +11121,15 @@
           </p:nvSpPr>
           <p:spPr>
             <a:xfrm>
-              <a:off x="6026359" y="7919954"/>
-              <a:ext cx="0" cy="182966"/>
+              <a:off x="3831641" y="6021012"/>
+              <a:ext cx="0" cy="147952"/>
             </a:xfrm>
             <a:custGeom>
               <a:avLst/>
               <a:pathLst>
-                <a:path w="0" h="182966">
+                <a:path w="0" h="147952">
                   <a:moveTo>
-                    <a:pt x="0" y="182966"/>
+                    <a:pt x="0" y="147952"/>
                   </a:moveTo>
                   <a:lnTo>
                     <a:pt x="0" y="0"/>
@@ -11161,15 +11161,15 @@
           </p:nvSpPr>
           <p:spPr>
             <a:xfrm>
-              <a:off x="6519424" y="7832949"/>
-              <a:ext cx="0" cy="205921"/>
+              <a:off x="4324706" y="5950656"/>
+              <a:ext cx="0" cy="166514"/>
             </a:xfrm>
             <a:custGeom>
               <a:avLst/>
               <a:pathLst>
-                <a:path w="0" h="205921">
+                <a:path w="0" h="166514">
                   <a:moveTo>
-                    <a:pt x="0" y="205921"/>
+                    <a:pt x="0" y="166514"/>
                   </a:moveTo>
                   <a:lnTo>
                     <a:pt x="0" y="0"/>
@@ -11201,15 +11201,15 @@
           </p:nvSpPr>
           <p:spPr>
             <a:xfrm>
-              <a:off x="7012489" y="7639345"/>
-              <a:ext cx="0" cy="212225"/>
+              <a:off x="4817771" y="5794103"/>
+              <a:ext cx="0" cy="171611"/>
             </a:xfrm>
             <a:custGeom>
               <a:avLst/>
               <a:pathLst>
-                <a:path w="0" h="212225">
+                <a:path w="0" h="171611">
                   <a:moveTo>
-                    <a:pt x="0" y="212225"/>
+                    <a:pt x="0" y="171611"/>
                   </a:moveTo>
                   <a:lnTo>
                     <a:pt x="0" y="0"/>
@@ -11241,15 +11241,15 @@
           </p:nvSpPr>
           <p:spPr>
             <a:xfrm>
-              <a:off x="7505554" y="7600230"/>
-              <a:ext cx="0" cy="202259"/>
+              <a:off x="5310835" y="5762472"/>
+              <a:ext cx="0" cy="163553"/>
             </a:xfrm>
             <a:custGeom>
               <a:avLst/>
               <a:pathLst>
-                <a:path w="0" h="202259">
+                <a:path w="0" h="163553">
                   <a:moveTo>
-                    <a:pt x="0" y="202259"/>
+                    <a:pt x="0" y="163553"/>
                   </a:moveTo>
                   <a:lnTo>
                     <a:pt x="0" y="0"/>
@@ -11281,15 +11281,15 @@
           </p:nvSpPr>
           <p:spPr>
             <a:xfrm>
-              <a:off x="7998619" y="7636779"/>
-              <a:ext cx="0" cy="221299"/>
+              <a:off x="5803900" y="5792027"/>
+              <a:ext cx="0" cy="178949"/>
             </a:xfrm>
             <a:custGeom>
               <a:avLst/>
               <a:pathLst>
-                <a:path w="0" h="221299">
+                <a:path w="0" h="178949">
                   <a:moveTo>
-                    <a:pt x="0" y="221299"/>
+                    <a:pt x="0" y="178949"/>
                   </a:moveTo>
                   <a:lnTo>
                     <a:pt x="0" y="0"/>
@@ -11321,15 +11321,15 @@
           </p:nvSpPr>
           <p:spPr>
             <a:xfrm>
-              <a:off x="8491684" y="7757903"/>
-              <a:ext cx="0" cy="309435"/>
+              <a:off x="6296965" y="5889972"/>
+              <a:ext cx="0" cy="250219"/>
             </a:xfrm>
             <a:custGeom>
               <a:avLst/>
               <a:pathLst>
-                <a:path w="0" h="309435">
+                <a:path w="0" h="250219">
                   <a:moveTo>
-                    <a:pt x="0" y="309435"/>
+                    <a:pt x="0" y="250219"/>
                   </a:moveTo>
                   <a:lnTo>
                     <a:pt x="0" y="0"/>
@@ -11361,15 +11361,15 @@
           </p:nvSpPr>
           <p:spPr>
             <a:xfrm>
-              <a:off x="8984748" y="7583714"/>
-              <a:ext cx="0" cy="514503"/>
+              <a:off x="6790030" y="5749117"/>
+              <a:ext cx="0" cy="416044"/>
             </a:xfrm>
             <a:custGeom>
               <a:avLst/>
               <a:pathLst>
-                <a:path w="0" h="514503">
+                <a:path w="0" h="416044">
                   <a:moveTo>
-                    <a:pt x="0" y="514503"/>
+                    <a:pt x="0" y="416044"/>
                   </a:moveTo>
                   <a:lnTo>
                     <a:pt x="0" y="0"/>
@@ -11401,15 +11401,15 @@
           </p:nvSpPr>
           <p:spPr>
             <a:xfrm>
-              <a:off x="9477813" y="7911312"/>
-              <a:ext cx="0" cy="666610"/>
+              <a:off x="7283095" y="6014023"/>
+              <a:ext cx="0" cy="539042"/>
             </a:xfrm>
             <a:custGeom>
               <a:avLst/>
               <a:pathLst>
-                <a:path w="0" h="666610">
+                <a:path w="0" h="539042">
                   <a:moveTo>
-                    <a:pt x="0" y="666610"/>
+                    <a:pt x="0" y="539042"/>
                   </a:moveTo>
                   <a:lnTo>
                     <a:pt x="0" y="0"/>
@@ -11441,15 +11441,15 @@
           </p:nvSpPr>
           <p:spPr>
             <a:xfrm>
-              <a:off x="9970878" y="7828514"/>
-              <a:ext cx="0" cy="126437"/>
+              <a:off x="7776160" y="5947070"/>
+              <a:ext cx="0" cy="102241"/>
             </a:xfrm>
             <a:custGeom>
               <a:avLst/>
               <a:pathLst>
-                <a:path w="0" h="126437">
+                <a:path w="0" h="102241">
                   <a:moveTo>
-                    <a:pt x="0" y="126437"/>
+                    <a:pt x="0" y="102241"/>
                   </a:moveTo>
                   <a:lnTo>
                     <a:pt x="0" y="0"/>
@@ -11481,39 +11481,39 @@
           </p:nvSpPr>
           <p:spPr>
             <a:xfrm>
-              <a:off x="5533295" y="7703340"/>
-              <a:ext cx="3944518" cy="578096"/>
+              <a:off x="3338576" y="5845851"/>
+              <a:ext cx="3944518" cy="467467"/>
             </a:xfrm>
             <a:custGeom>
               <a:avLst/>
               <a:pathLst>
-                <a:path w="3944518" h="578096">
+                <a:path w="3944518" h="467467">
                   <a:moveTo>
-                    <a:pt x="0" y="65761"/>
+                    <a:pt x="0" y="53176"/>
                   </a:moveTo>
                   <a:lnTo>
-                    <a:pt x="493064" y="309939"/>
-                  </a:lnTo>
-                  <a:lnTo>
-                    <a:pt x="986129" y="234827"/>
-                  </a:lnTo>
-                  <a:lnTo>
-                    <a:pt x="1479194" y="44336"/>
+                    <a:pt x="493064" y="250626"/>
+                  </a:lnTo>
+                  <a:lnTo>
+                    <a:pt x="986129" y="189888"/>
+                  </a:lnTo>
+                  <a:lnTo>
+                    <a:pt x="1479194" y="35851"/>
                   </a:lnTo>
                   <a:lnTo>
                     <a:pt x="1972259" y="0"/>
                   </a:lnTo>
                   <a:lnTo>
-                    <a:pt x="2465324" y="46502"/>
-                  </a:lnTo>
-                  <a:lnTo>
-                    <a:pt x="2958388" y="214332"/>
-                  </a:lnTo>
-                  <a:lnTo>
-                    <a:pt x="3451453" y="151205"/>
-                  </a:lnTo>
-                  <a:lnTo>
-                    <a:pt x="3944518" y="578096"/>
+                    <a:pt x="2465324" y="37603"/>
+                  </a:lnTo>
+                  <a:lnTo>
+                    <a:pt x="2958388" y="173316"/>
+                  </a:lnTo>
+                  <a:lnTo>
+                    <a:pt x="3451453" y="122269"/>
+                  </a:lnTo>
+                  <a:lnTo>
+                    <a:pt x="3944518" y="467467"/>
                   </a:lnTo>
                 </a:path>
               </a:pathLst>
@@ -11542,7 +11542,7 @@
           </p:nvSpPr>
           <p:spPr>
             <a:xfrm>
-              <a:off x="5286762" y="8577922"/>
+              <a:off x="3092044" y="6553066"/>
               <a:ext cx="4930648" cy="0"/>
             </a:xfrm>
             <a:custGeom>
@@ -11585,7 +11585,7 @@
           </p:nvSpPr>
           <p:spPr>
             <a:xfrm>
-              <a:off x="5286762" y="7152898"/>
+              <a:off x="3092044" y="5356641"/>
               <a:ext cx="4930648" cy="230468"/>
             </a:xfrm>
             <a:prstGeom prst="rect">
@@ -11611,7 +11611,7 @@
           </p:nvSpPr>
           <p:spPr>
             <a:xfrm>
-              <a:off x="7589536" y="7221519"/>
+              <a:off x="5394818" y="5425263"/>
               <a:ext cx="325100" cy="90249"/>
             </a:xfrm>
             <a:prstGeom prst="rect">
@@ -11657,7 +11657,7 @@
           </p:nvSpPr>
           <p:spPr>
             <a:xfrm>
-              <a:off x="5286762" y="5658284"/>
+              <a:off x="3092044" y="4090628"/>
               <a:ext cx="4930648" cy="230468"/>
             </a:xfrm>
             <a:prstGeom prst="rect">
@@ -11683,7 +11683,7 @@
           </p:nvSpPr>
           <p:spPr>
             <a:xfrm>
-              <a:off x="7440262" y="5704224"/>
+              <a:off x="5245543" y="4136568"/>
               <a:ext cx="623649" cy="112930"/>
             </a:xfrm>
             <a:prstGeom prst="rect">
@@ -11729,7 +11729,7 @@
           </p:nvSpPr>
           <p:spPr>
             <a:xfrm>
-              <a:off x="5533295" y="8577922"/>
+              <a:off x="3338576" y="6553066"/>
               <a:ext cx="0" cy="34794"/>
             </a:xfrm>
             <a:custGeom>
@@ -11769,7 +11769,7 @@
           </p:nvSpPr>
           <p:spPr>
             <a:xfrm>
-              <a:off x="6026359" y="8577922"/>
+              <a:off x="3831641" y="6553066"/>
               <a:ext cx="0" cy="34794"/>
             </a:xfrm>
             <a:custGeom>
@@ -11809,7 +11809,7 @@
           </p:nvSpPr>
           <p:spPr>
             <a:xfrm>
-              <a:off x="6519424" y="8577922"/>
+              <a:off x="4324706" y="6553066"/>
               <a:ext cx="0" cy="34794"/>
             </a:xfrm>
             <a:custGeom>
@@ -11849,7 +11849,7 @@
           </p:nvSpPr>
           <p:spPr>
             <a:xfrm>
-              <a:off x="7012489" y="8577922"/>
+              <a:off x="4817771" y="6553066"/>
               <a:ext cx="0" cy="34794"/>
             </a:xfrm>
             <a:custGeom>
@@ -11889,7 +11889,7 @@
           </p:nvSpPr>
           <p:spPr>
             <a:xfrm>
-              <a:off x="7505554" y="8577922"/>
+              <a:off x="5310835" y="6553066"/>
               <a:ext cx="0" cy="34794"/>
             </a:xfrm>
             <a:custGeom>
@@ -11929,7 +11929,7 @@
           </p:nvSpPr>
           <p:spPr>
             <a:xfrm>
-              <a:off x="7998619" y="8577922"/>
+              <a:off x="5803900" y="6553066"/>
               <a:ext cx="0" cy="34794"/>
             </a:xfrm>
             <a:custGeom>
@@ -11969,7 +11969,7 @@
           </p:nvSpPr>
           <p:spPr>
             <a:xfrm>
-              <a:off x="8491684" y="8577922"/>
+              <a:off x="6296965" y="6553066"/>
               <a:ext cx="0" cy="34794"/>
             </a:xfrm>
             <a:custGeom>
@@ -12009,7 +12009,7 @@
           </p:nvSpPr>
           <p:spPr>
             <a:xfrm>
-              <a:off x="8984748" y="8577922"/>
+              <a:off x="6790030" y="6553066"/>
               <a:ext cx="0" cy="34794"/>
             </a:xfrm>
             <a:custGeom>
@@ -12049,7 +12049,7 @@
           </p:nvSpPr>
           <p:spPr>
             <a:xfrm>
-              <a:off x="9477813" y="8577922"/>
+              <a:off x="7283095" y="6553066"/>
               <a:ext cx="0" cy="34794"/>
             </a:xfrm>
             <a:custGeom>
@@ -12089,7 +12089,7 @@
           </p:nvSpPr>
           <p:spPr>
             <a:xfrm>
-              <a:off x="9970878" y="8577922"/>
+              <a:off x="7776160" y="6553066"/>
               <a:ext cx="0" cy="34794"/>
             </a:xfrm>
             <a:custGeom>
@@ -12129,7 +12129,7 @@
           </p:nvSpPr>
           <p:spPr>
             <a:xfrm>
-              <a:off x="5445188" y="8638707"/>
+              <a:off x="3250470" y="6613850"/>
               <a:ext cx="176212" cy="89118"/>
             </a:xfrm>
             <a:prstGeom prst="rect">
@@ -12175,7 +12175,7 @@
           </p:nvSpPr>
           <p:spPr>
             <a:xfrm>
-              <a:off x="5870447" y="8638707"/>
+              <a:off x="3675729" y="6613850"/>
               <a:ext cx="311824" cy="89118"/>
             </a:xfrm>
             <a:prstGeom prst="rect">
@@ -12221,7 +12221,7 @@
           </p:nvSpPr>
           <p:spPr>
             <a:xfrm>
-              <a:off x="6363512" y="8638707"/>
+              <a:off x="4168793" y="6613850"/>
               <a:ext cx="311824" cy="89118"/>
             </a:xfrm>
             <a:prstGeom prst="rect">
@@ -12267,7 +12267,7 @@
           </p:nvSpPr>
           <p:spPr>
             <a:xfrm>
-              <a:off x="6856577" y="8638647"/>
+              <a:off x="4661858" y="6613791"/>
               <a:ext cx="311824" cy="89177"/>
             </a:xfrm>
             <a:prstGeom prst="rect">
@@ -12313,7 +12313,7 @@
           </p:nvSpPr>
           <p:spPr>
             <a:xfrm>
-              <a:off x="7349642" y="8638707"/>
+              <a:off x="5154923" y="6613850"/>
               <a:ext cx="311824" cy="89118"/>
             </a:xfrm>
             <a:prstGeom prst="rect">
@@ -12359,7 +12359,7 @@
           </p:nvSpPr>
           <p:spPr>
             <a:xfrm>
-              <a:off x="7842706" y="8638707"/>
+              <a:off x="5647988" y="6613850"/>
               <a:ext cx="311824" cy="89118"/>
             </a:xfrm>
             <a:prstGeom prst="rect">
@@ -12405,7 +12405,7 @@
           </p:nvSpPr>
           <p:spPr>
             <a:xfrm>
-              <a:off x="8335771" y="8638707"/>
+              <a:off x="6141053" y="6613850"/>
               <a:ext cx="311824" cy="89118"/>
             </a:xfrm>
             <a:prstGeom prst="rect">
@@ -12451,7 +12451,7 @@
           </p:nvSpPr>
           <p:spPr>
             <a:xfrm>
-              <a:off x="8828836" y="8638707"/>
+              <a:off x="6634118" y="6613850"/>
               <a:ext cx="311824" cy="89118"/>
             </a:xfrm>
             <a:prstGeom prst="rect">
@@ -12497,7 +12497,7 @@
           </p:nvSpPr>
           <p:spPr>
             <a:xfrm>
-              <a:off x="9374407" y="8638707"/>
+              <a:off x="7179689" y="6613850"/>
               <a:ext cx="206811" cy="89118"/>
             </a:xfrm>
             <a:prstGeom prst="rect">
@@ -12543,7 +12543,7 @@
           </p:nvSpPr>
           <p:spPr>
             <a:xfrm>
-              <a:off x="9872592" y="8637516"/>
+              <a:off x="7677873" y="6612660"/>
               <a:ext cx="196572" cy="90308"/>
             </a:xfrm>
             <a:prstGeom prst="rect">
@@ -12589,7 +12589,7 @@
           </p:nvSpPr>
           <p:spPr>
             <a:xfrm>
-              <a:off x="5054647" y="7037827"/>
+              <a:off x="2859928" y="5241570"/>
               <a:ext cx="169485" cy="89118"/>
             </a:xfrm>
             <a:prstGeom prst="rect">
@@ -12635,7 +12635,7 @@
           </p:nvSpPr>
           <p:spPr>
             <a:xfrm>
-              <a:off x="5054647" y="6698013"/>
+              <a:off x="2859928" y="4967071"/>
               <a:ext cx="169485" cy="87630"/>
             </a:xfrm>
             <a:prstGeom prst="rect">
@@ -12681,7 +12681,7 @@
           </p:nvSpPr>
           <p:spPr>
             <a:xfrm>
-              <a:off x="5054647" y="6356712"/>
+              <a:off x="2859928" y="4691084"/>
               <a:ext cx="169485" cy="87630"/>
             </a:xfrm>
             <a:prstGeom prst="rect">
@@ -12727,7 +12727,7 @@
           </p:nvSpPr>
           <p:spPr>
             <a:xfrm>
-              <a:off x="5054647" y="6013922"/>
+              <a:off x="2859928" y="4413608"/>
               <a:ext cx="169485" cy="89118"/>
             </a:xfrm>
             <a:prstGeom prst="rect">
@@ -12773,7 +12773,7 @@
           </p:nvSpPr>
           <p:spPr>
             <a:xfrm>
-              <a:off x="5251968" y="7083309"/>
+              <a:off x="3057249" y="5287052"/>
               <a:ext cx="34794" cy="0"/>
             </a:xfrm>
             <a:custGeom>
@@ -12813,7 +12813,7 @@
           </p:nvSpPr>
           <p:spPr>
             <a:xfrm>
-              <a:off x="5251968" y="6742007"/>
+              <a:off x="3057249" y="5011065"/>
               <a:ext cx="34794" cy="0"/>
             </a:xfrm>
             <a:custGeom>
@@ -12853,7 +12853,7 @@
           </p:nvSpPr>
           <p:spPr>
             <a:xfrm>
-              <a:off x="5251968" y="6400705"/>
+              <a:off x="3057249" y="4735077"/>
               <a:ext cx="34794" cy="0"/>
             </a:xfrm>
             <a:custGeom>
@@ -12893,7 +12893,7 @@
           </p:nvSpPr>
           <p:spPr>
             <a:xfrm>
-              <a:off x="5251968" y="6059404"/>
+              <a:off x="3057249" y="4459090"/>
               <a:ext cx="34794" cy="0"/>
             </a:xfrm>
             <a:custGeom>
@@ -12933,7 +12933,7 @@
           </p:nvSpPr>
           <p:spPr>
             <a:xfrm>
-              <a:off x="5054647" y="8532440"/>
+              <a:off x="2859928" y="6507584"/>
               <a:ext cx="169485" cy="89118"/>
             </a:xfrm>
             <a:prstGeom prst="rect">
@@ -12979,7 +12979,7 @@
           </p:nvSpPr>
           <p:spPr>
             <a:xfrm>
-              <a:off x="5054647" y="8192627"/>
+              <a:off x="2859928" y="6233085"/>
               <a:ext cx="169485" cy="87630"/>
             </a:xfrm>
             <a:prstGeom prst="rect">
@@ -13025,7 +13025,7 @@
           </p:nvSpPr>
           <p:spPr>
             <a:xfrm>
-              <a:off x="5054647" y="7851325"/>
+              <a:off x="2859928" y="5957097"/>
               <a:ext cx="169485" cy="87630"/>
             </a:xfrm>
             <a:prstGeom prst="rect">
@@ -13071,7 +13071,7 @@
           </p:nvSpPr>
           <p:spPr>
             <a:xfrm>
-              <a:off x="5054647" y="7508535"/>
+              <a:off x="2859928" y="5679622"/>
               <a:ext cx="169485" cy="89118"/>
             </a:xfrm>
             <a:prstGeom prst="rect">
@@ -13117,7 +13117,7 @@
           </p:nvSpPr>
           <p:spPr>
             <a:xfrm>
-              <a:off x="5251968" y="8577922"/>
+              <a:off x="3057249" y="6553066"/>
               <a:ext cx="34794" cy="0"/>
             </a:xfrm>
             <a:custGeom>
@@ -13157,7 +13157,7 @@
           </p:nvSpPr>
           <p:spPr>
             <a:xfrm>
-              <a:off x="5251968" y="8236621"/>
+              <a:off x="3057249" y="6277078"/>
               <a:ext cx="34794" cy="0"/>
             </a:xfrm>
             <a:custGeom>
@@ -13197,7 +13197,7 @@
           </p:nvSpPr>
           <p:spPr>
             <a:xfrm>
-              <a:off x="5251968" y="7895319"/>
+              <a:off x="3057249" y="6001091"/>
               <a:ext cx="34794" cy="0"/>
             </a:xfrm>
             <a:custGeom>
@@ -13237,7 +13237,7 @@
           </p:nvSpPr>
           <p:spPr>
             <a:xfrm>
-              <a:off x="5251968" y="7554017"/>
+              <a:off x="3057249" y="5725103"/>
               <a:ext cx="34794" cy="0"/>
             </a:xfrm>
             <a:custGeom>
@@ -13277,7 +13277,7 @@
           </p:nvSpPr>
           <p:spPr>
             <a:xfrm>
-              <a:off x="6781950" y="8760540"/>
+              <a:off x="4587232" y="6735684"/>
               <a:ext cx="1940272" cy="143023"/>
             </a:xfrm>
             <a:prstGeom prst="rect">
@@ -13323,7 +13323,7 @@
           </p:nvSpPr>
           <p:spPr>
             <a:xfrm rot="-5400000">
-              <a:off x="3789548" y="7161788"/>
+              <a:off x="1594829" y="5365532"/>
               <a:ext cx="2236365" cy="143098"/>
             </a:xfrm>
             <a:prstGeom prst="rect">

</xml_diff>